<commit_message>
Präsentation OSA 4 fertig
Die Präsentation ist rein inhaltlich fertig, der Feinschliff kommt noch.
</commit_message>
<xml_diff>
--- a/OrgatheoretAns/OrgatheoretAnsPraes.pptx
+++ b/OrgatheoretAns/OrgatheoretAnsPraes.pptx
@@ -5,7 +5,7 @@
     <p:sldMasterId id="2147483685" r:id="rId1"/>
   </p:sldMasterIdLst>
   <p:notesMasterIdLst>
-    <p:notesMasterId r:id="rId31"/>
+    <p:notesMasterId r:id="rId46"/>
   </p:notesMasterIdLst>
   <p:sldIdLst>
     <p:sldId id="279" r:id="rId2"/>
@@ -24,19 +24,34 @@
     <p:sldId id="314" r:id="rId15"/>
     <p:sldId id="315" r:id="rId16"/>
     <p:sldId id="316" r:id="rId17"/>
-    <p:sldId id="317" r:id="rId18"/>
-    <p:sldId id="318" r:id="rId19"/>
-    <p:sldId id="319" r:id="rId20"/>
-    <p:sldId id="320" r:id="rId21"/>
-    <p:sldId id="321" r:id="rId22"/>
-    <p:sldId id="322" r:id="rId23"/>
-    <p:sldId id="323" r:id="rId24"/>
-    <p:sldId id="324" r:id="rId25"/>
-    <p:sldId id="325" r:id="rId26"/>
-    <p:sldId id="326" r:id="rId27"/>
-    <p:sldId id="327" r:id="rId28"/>
-    <p:sldId id="328" r:id="rId29"/>
-    <p:sldId id="301" r:id="rId30"/>
+    <p:sldId id="343" r:id="rId18"/>
+    <p:sldId id="317" r:id="rId19"/>
+    <p:sldId id="318" r:id="rId20"/>
+    <p:sldId id="319" r:id="rId21"/>
+    <p:sldId id="320" r:id="rId22"/>
+    <p:sldId id="321" r:id="rId23"/>
+    <p:sldId id="322" r:id="rId24"/>
+    <p:sldId id="323" r:id="rId25"/>
+    <p:sldId id="324" r:id="rId26"/>
+    <p:sldId id="325" r:id="rId27"/>
+    <p:sldId id="326" r:id="rId28"/>
+    <p:sldId id="327" r:id="rId29"/>
+    <p:sldId id="328" r:id="rId30"/>
+    <p:sldId id="329" r:id="rId31"/>
+    <p:sldId id="332" r:id="rId32"/>
+    <p:sldId id="330" r:id="rId33"/>
+    <p:sldId id="331" r:id="rId34"/>
+    <p:sldId id="333" r:id="rId35"/>
+    <p:sldId id="334" r:id="rId36"/>
+    <p:sldId id="335" r:id="rId37"/>
+    <p:sldId id="336" r:id="rId38"/>
+    <p:sldId id="337" r:id="rId39"/>
+    <p:sldId id="338" r:id="rId40"/>
+    <p:sldId id="339" r:id="rId41"/>
+    <p:sldId id="340" r:id="rId42"/>
+    <p:sldId id="341" r:id="rId43"/>
+    <p:sldId id="342" r:id="rId44"/>
+    <p:sldId id="301" r:id="rId45"/>
   </p:sldIdLst>
   <p:sldSz cx="12192000" cy="6858000"/>
   <p:notesSz cx="6858000" cy="9144000"/>
@@ -137,7 +152,7 @@
   </p:defaultTextStyle>
   <p:extLst>
     <p:ext uri="{EFAFB233-063F-42B5-8137-9DF3F51BA10A}">
-      <p15:sldGuideLst xmlns:p15="http://schemas.microsoft.com/office/powerpoint/2012/main" xmlns=""/>
+      <p15:sldGuideLst xmlns="" xmlns:p15="http://schemas.microsoft.com/office/powerpoint/2012/main"/>
     </p:ext>
   </p:extLst>
 </p:presentation>
@@ -231,7 +246,7 @@
           <a:p>
             <a:fld id="{FD0E5214-A780-45B3-8C91-E131831524A4}" type="datetimeFigureOut">
               <a:rPr lang="de-DE" smtClean="0"/>
-              <a:t>01.04.2015</a:t>
+              <a:t>02.04.2015</a:t>
             </a:fld>
             <a:endParaRPr lang="de-DE"/>
           </a:p>
@@ -777,6 +792,14 @@
           <a:bodyPr/>
           <a:lstStyle/>
           <a:p>
+            <a:r>
+              <a:rPr lang="de-DE" dirty="0" err="1" smtClean="0"/>
+              <a:t>Bsp</a:t>
+            </a:r>
+            <a:r>
+              <a:rPr lang="de-DE" baseline="0" dirty="0" smtClean="0"/>
+              <a:t> für Theorien: Bedürfnispyramide nach Maslow, X-Y-Theorie, Zweifaktoren-Theorie (in Vorlesung gehabt)</a:t>
+            </a:r>
             <a:endParaRPr lang="de-DE" dirty="0"/>
           </a:p>
         </p:txBody>
@@ -798,7 +821,197 @@
           <a:p>
             <a:fld id="{291A2AE1-9A89-46FB-B262-609F9F6D1590}" type="slidenum">
               <a:rPr lang="de-DE" smtClean="0"/>
-              <a:t>22</a:t>
+              <a:t>16</a:t>
+            </a:fld>
+            <a:endParaRPr lang="de-DE"/>
+          </a:p>
+        </p:txBody>
+      </p:sp>
+    </p:spTree>
+    <p:extLst>
+      <p:ext uri="{BB962C8B-B14F-4D97-AF65-F5344CB8AC3E}">
+        <p14:creationId xmlns:p14="http://schemas.microsoft.com/office/powerpoint/2010/main" val="201621632"/>
+      </p:ext>
+    </p:extLst>
+  </p:cSld>
+  <p:clrMapOvr>
+    <a:masterClrMapping/>
+  </p:clrMapOvr>
+</p:notes>
+</file>
+
+<file path=ppt/notesSlides/notesSlide4.xml><?xml version="1.0" encoding="utf-8"?>
+<p:notes xmlns:a="http://schemas.openxmlformats.org/drawingml/2006/main" xmlns:r="http://schemas.openxmlformats.org/officeDocument/2006/relationships" xmlns:p="http://schemas.openxmlformats.org/presentationml/2006/main">
+  <p:cSld>
+    <p:spTree>
+      <p:nvGrpSpPr>
+        <p:cNvPr id="1" name=""/>
+        <p:cNvGrpSpPr/>
+        <p:nvPr/>
+      </p:nvGrpSpPr>
+      <p:grpSpPr>
+        <a:xfrm>
+          <a:off x="0" y="0"/>
+          <a:ext cx="0" cy="0"/>
+          <a:chOff x="0" y="0"/>
+          <a:chExt cx="0" cy="0"/>
+        </a:xfrm>
+      </p:grpSpPr>
+      <p:sp>
+        <p:nvSpPr>
+          <p:cNvPr id="2" name="Folienbildplatzhalter 1"/>
+          <p:cNvSpPr>
+            <a:spLocks noGrp="1" noRot="1" noChangeAspect="1"/>
+          </p:cNvSpPr>
+          <p:nvPr>
+            <p:ph type="sldImg"/>
+          </p:nvPr>
+        </p:nvSpPr>
+        <p:spPr/>
+      </p:sp>
+      <p:sp>
+        <p:nvSpPr>
+          <p:cNvPr id="3" name="Notizenplatzhalter 2"/>
+          <p:cNvSpPr>
+            <a:spLocks noGrp="1"/>
+          </p:cNvSpPr>
+          <p:nvPr>
+            <p:ph type="body" idx="1"/>
+          </p:nvPr>
+        </p:nvSpPr>
+        <p:spPr/>
+        <p:txBody>
+          <a:bodyPr/>
+          <a:lstStyle/>
+          <a:p>
+            <a:r>
+              <a:rPr lang="de-DE" dirty="0" smtClean="0"/>
+              <a:t>Organisationslaboratorium:</a:t>
+            </a:r>
+            <a:r>
+              <a:rPr lang="de-DE" baseline="0" dirty="0" smtClean="0"/>
+              <a:t> </a:t>
+            </a:r>
+            <a:r>
+              <a:rPr lang="de-DE" dirty="0" smtClean="0"/>
+              <a:t>Aus dem Plenum heraus müssen sich die Teilnehmer selbst organisieren, also gegebenenfalls auch Arbeitsgruppen selbst bilden</a:t>
+            </a:r>
+          </a:p>
+          <a:p>
+            <a:r>
+              <a:rPr lang="de-DE" dirty="0" smtClean="0"/>
+              <a:t>Survey</a:t>
+            </a:r>
+            <a:r>
+              <a:rPr lang="de-DE" baseline="0" dirty="0" smtClean="0"/>
+              <a:t> Feedback:  Kombination von Mitarbeiterbefragung und Vorgesetztenbeurteilung als Ausgangspunkt für Organisationsentwicklung</a:t>
+            </a:r>
+            <a:endParaRPr lang="de-DE" dirty="0"/>
+          </a:p>
+        </p:txBody>
+      </p:sp>
+      <p:sp>
+        <p:nvSpPr>
+          <p:cNvPr id="4" name="Foliennummernplatzhalter 3"/>
+          <p:cNvSpPr>
+            <a:spLocks noGrp="1"/>
+          </p:cNvSpPr>
+          <p:nvPr>
+            <p:ph type="sldNum" sz="quarter" idx="10"/>
+          </p:nvPr>
+        </p:nvSpPr>
+        <p:spPr/>
+        <p:txBody>
+          <a:bodyPr/>
+          <a:lstStyle/>
+          <a:p>
+            <a:fld id="{291A2AE1-9A89-46FB-B262-609F9F6D1590}" type="slidenum">
+              <a:rPr lang="de-DE" smtClean="0"/>
+              <a:t>18</a:t>
+            </a:fld>
+            <a:endParaRPr lang="de-DE"/>
+          </a:p>
+        </p:txBody>
+      </p:sp>
+    </p:spTree>
+    <p:extLst>
+      <p:ext uri="{BB962C8B-B14F-4D97-AF65-F5344CB8AC3E}">
+        <p14:creationId xmlns:p14="http://schemas.microsoft.com/office/powerpoint/2010/main" val="3026927320"/>
+      </p:ext>
+    </p:extLst>
+  </p:cSld>
+  <p:clrMapOvr>
+    <a:masterClrMapping/>
+  </p:clrMapOvr>
+</p:notes>
+</file>
+
+<file path=ppt/notesSlides/notesSlide5.xml><?xml version="1.0" encoding="utf-8"?>
+<p:notes xmlns:a="http://schemas.openxmlformats.org/drawingml/2006/main" xmlns:r="http://schemas.openxmlformats.org/officeDocument/2006/relationships" xmlns:p="http://schemas.openxmlformats.org/presentationml/2006/main">
+  <p:cSld>
+    <p:spTree>
+      <p:nvGrpSpPr>
+        <p:cNvPr id="1" name=""/>
+        <p:cNvGrpSpPr/>
+        <p:nvPr/>
+      </p:nvGrpSpPr>
+      <p:grpSpPr>
+        <a:xfrm>
+          <a:off x="0" y="0"/>
+          <a:ext cx="0" cy="0"/>
+          <a:chOff x="0" y="0"/>
+          <a:chExt cx="0" cy="0"/>
+        </a:xfrm>
+      </p:grpSpPr>
+      <p:sp>
+        <p:nvSpPr>
+          <p:cNvPr id="2" name="Folienbildplatzhalter 1"/>
+          <p:cNvSpPr>
+            <a:spLocks noGrp="1" noRot="1" noChangeAspect="1"/>
+          </p:cNvSpPr>
+          <p:nvPr>
+            <p:ph type="sldImg"/>
+          </p:nvPr>
+        </p:nvSpPr>
+        <p:spPr/>
+      </p:sp>
+      <p:sp>
+        <p:nvSpPr>
+          <p:cNvPr id="3" name="Notizenplatzhalter 2"/>
+          <p:cNvSpPr>
+            <a:spLocks noGrp="1"/>
+          </p:cNvSpPr>
+          <p:nvPr>
+            <p:ph type="body" idx="1"/>
+          </p:nvPr>
+        </p:nvSpPr>
+        <p:spPr/>
+        <p:txBody>
+          <a:bodyPr/>
+          <a:lstStyle/>
+          <a:p>
+            <a:endParaRPr lang="de-DE" dirty="0"/>
+          </a:p>
+        </p:txBody>
+      </p:sp>
+      <p:sp>
+        <p:nvSpPr>
+          <p:cNvPr id="4" name="Foliennummernplatzhalter 3"/>
+          <p:cNvSpPr>
+            <a:spLocks noGrp="1"/>
+          </p:cNvSpPr>
+          <p:nvPr>
+            <p:ph type="sldNum" sz="quarter" idx="10"/>
+          </p:nvPr>
+        </p:nvSpPr>
+        <p:spPr/>
+        <p:txBody>
+          <a:bodyPr/>
+          <a:lstStyle/>
+          <a:p>
+            <a:fld id="{291A2AE1-9A89-46FB-B262-609F9F6D1590}" type="slidenum">
+              <a:rPr lang="de-DE" smtClean="0"/>
+              <a:t>23</a:t>
             </a:fld>
             <a:endParaRPr lang="de-DE"/>
           </a:p>
@@ -808,6 +1021,308 @@
     <p:extLst>
       <p:ext uri="{BB962C8B-B14F-4D97-AF65-F5344CB8AC3E}">
         <p14:creationId xmlns:p14="http://schemas.microsoft.com/office/powerpoint/2010/main" val="4230909634"/>
+      </p:ext>
+    </p:extLst>
+  </p:cSld>
+  <p:clrMapOvr>
+    <a:masterClrMapping/>
+  </p:clrMapOvr>
+</p:notes>
+</file>
+
+<file path=ppt/notesSlides/notesSlide6.xml><?xml version="1.0" encoding="utf-8"?>
+<p:notes xmlns:a="http://schemas.openxmlformats.org/drawingml/2006/main" xmlns:r="http://schemas.openxmlformats.org/officeDocument/2006/relationships" xmlns:p="http://schemas.openxmlformats.org/presentationml/2006/main">
+  <p:cSld>
+    <p:spTree>
+      <p:nvGrpSpPr>
+        <p:cNvPr id="1" name=""/>
+        <p:cNvGrpSpPr/>
+        <p:nvPr/>
+      </p:nvGrpSpPr>
+      <p:grpSpPr>
+        <a:xfrm>
+          <a:off x="0" y="0"/>
+          <a:ext cx="0" cy="0"/>
+          <a:chOff x="0" y="0"/>
+          <a:chExt cx="0" cy="0"/>
+        </a:xfrm>
+      </p:grpSpPr>
+      <p:sp>
+        <p:nvSpPr>
+          <p:cNvPr id="2" name="Folienbildplatzhalter 1"/>
+          <p:cNvSpPr>
+            <a:spLocks noGrp="1" noRot="1" noChangeAspect="1"/>
+          </p:cNvSpPr>
+          <p:nvPr>
+            <p:ph type="sldImg"/>
+          </p:nvPr>
+        </p:nvSpPr>
+        <p:spPr/>
+      </p:sp>
+      <p:sp>
+        <p:nvSpPr>
+          <p:cNvPr id="3" name="Notizenplatzhalter 2"/>
+          <p:cNvSpPr>
+            <a:spLocks noGrp="1"/>
+          </p:cNvSpPr>
+          <p:nvPr>
+            <p:ph type="body" idx="1"/>
+          </p:nvPr>
+        </p:nvSpPr>
+        <p:spPr/>
+        <p:txBody>
+          <a:bodyPr/>
+          <a:lstStyle/>
+          <a:p>
+            <a:r>
+              <a:rPr lang="de-DE" dirty="0" smtClean="0"/>
+              <a:t>Veränderte Anforderungen: z.B.</a:t>
+            </a:r>
+            <a:r>
+              <a:rPr lang="de-DE" baseline="0" dirty="0" smtClean="0"/>
+              <a:t> verschärften Wettbewerb, technischen Fortschritt</a:t>
+            </a:r>
+          </a:p>
+          <a:p>
+            <a:endParaRPr lang="de-DE" baseline="0" dirty="0" smtClean="0"/>
+          </a:p>
+        </p:txBody>
+      </p:sp>
+      <p:sp>
+        <p:nvSpPr>
+          <p:cNvPr id="4" name="Foliennummernplatzhalter 3"/>
+          <p:cNvSpPr>
+            <a:spLocks noGrp="1"/>
+          </p:cNvSpPr>
+          <p:nvPr>
+            <p:ph type="sldNum" sz="quarter" idx="10"/>
+          </p:nvPr>
+        </p:nvSpPr>
+        <p:spPr/>
+        <p:txBody>
+          <a:bodyPr/>
+          <a:lstStyle/>
+          <a:p>
+            <a:fld id="{291A2AE1-9A89-46FB-B262-609F9F6D1590}" type="slidenum">
+              <a:rPr lang="de-DE" smtClean="0"/>
+              <a:t>33</a:t>
+            </a:fld>
+            <a:endParaRPr lang="de-DE"/>
+          </a:p>
+        </p:txBody>
+      </p:sp>
+    </p:spTree>
+    <p:extLst>
+      <p:ext uri="{BB962C8B-B14F-4D97-AF65-F5344CB8AC3E}">
+        <p14:creationId xmlns:p14="http://schemas.microsoft.com/office/powerpoint/2010/main" val="2888383188"/>
+      </p:ext>
+    </p:extLst>
+  </p:cSld>
+  <p:clrMapOvr>
+    <a:masterClrMapping/>
+  </p:clrMapOvr>
+</p:notes>
+</file>
+
+<file path=ppt/notesSlides/notesSlide7.xml><?xml version="1.0" encoding="utf-8"?>
+<p:notes xmlns:a="http://schemas.openxmlformats.org/drawingml/2006/main" xmlns:r="http://schemas.openxmlformats.org/officeDocument/2006/relationships" xmlns:p="http://schemas.openxmlformats.org/presentationml/2006/main">
+  <p:cSld>
+    <p:spTree>
+      <p:nvGrpSpPr>
+        <p:cNvPr id="1" name=""/>
+        <p:cNvGrpSpPr/>
+        <p:nvPr/>
+      </p:nvGrpSpPr>
+      <p:grpSpPr>
+        <a:xfrm>
+          <a:off x="0" y="0"/>
+          <a:ext cx="0" cy="0"/>
+          <a:chOff x="0" y="0"/>
+          <a:chExt cx="0" cy="0"/>
+        </a:xfrm>
+      </p:grpSpPr>
+      <p:sp>
+        <p:nvSpPr>
+          <p:cNvPr id="2" name="Folienbildplatzhalter 1"/>
+          <p:cNvSpPr>
+            <a:spLocks noGrp="1" noRot="1" noChangeAspect="1"/>
+          </p:cNvSpPr>
+          <p:nvPr>
+            <p:ph type="sldImg"/>
+          </p:nvPr>
+        </p:nvSpPr>
+        <p:spPr/>
+      </p:sp>
+      <p:sp>
+        <p:nvSpPr>
+          <p:cNvPr id="3" name="Notizenplatzhalter 2"/>
+          <p:cNvSpPr>
+            <a:spLocks noGrp="1"/>
+          </p:cNvSpPr>
+          <p:nvPr>
+            <p:ph type="body" idx="1"/>
+          </p:nvPr>
+        </p:nvSpPr>
+        <p:spPr/>
+        <p:txBody>
+          <a:bodyPr/>
+          <a:lstStyle/>
+          <a:p>
+            <a:r>
+              <a:rPr lang="de-DE" baseline="0" dirty="0" smtClean="0"/>
+              <a:t>Vor allem die Organisationsstruktur wird berücksichtigt</a:t>
+            </a:r>
+          </a:p>
+          <a:p>
+            <a:r>
+              <a:rPr lang="de-DE" baseline="0" dirty="0" smtClean="0"/>
+              <a:t>Herbeiführen der gewünschten Wirkungen durch geeignete Organisationsstruktur</a:t>
+            </a:r>
+            <a:endParaRPr lang="de-DE" dirty="0" smtClean="0"/>
+          </a:p>
+        </p:txBody>
+      </p:sp>
+      <p:sp>
+        <p:nvSpPr>
+          <p:cNvPr id="4" name="Foliennummernplatzhalter 3"/>
+          <p:cNvSpPr>
+            <a:spLocks noGrp="1"/>
+          </p:cNvSpPr>
+          <p:nvPr>
+            <p:ph type="sldNum" sz="quarter" idx="10"/>
+          </p:nvPr>
+        </p:nvSpPr>
+        <p:spPr/>
+        <p:txBody>
+          <a:bodyPr/>
+          <a:lstStyle/>
+          <a:p>
+            <a:fld id="{291A2AE1-9A89-46FB-B262-609F9F6D1590}" type="slidenum">
+              <a:rPr lang="de-DE" smtClean="0"/>
+              <a:t>34</a:t>
+            </a:fld>
+            <a:endParaRPr lang="de-DE"/>
+          </a:p>
+        </p:txBody>
+      </p:sp>
+    </p:spTree>
+    <p:extLst>
+      <p:ext uri="{BB962C8B-B14F-4D97-AF65-F5344CB8AC3E}">
+        <p14:creationId xmlns:p14="http://schemas.microsoft.com/office/powerpoint/2010/main" val="3242996988"/>
+      </p:ext>
+    </p:extLst>
+  </p:cSld>
+  <p:clrMapOvr>
+    <a:masterClrMapping/>
+  </p:clrMapOvr>
+</p:notes>
+</file>
+
+<file path=ppt/notesSlides/notesSlide8.xml><?xml version="1.0" encoding="utf-8"?>
+<p:notes xmlns:a="http://schemas.openxmlformats.org/drawingml/2006/main" xmlns:r="http://schemas.openxmlformats.org/officeDocument/2006/relationships" xmlns:p="http://schemas.openxmlformats.org/presentationml/2006/main">
+  <p:cSld>
+    <p:spTree>
+      <p:nvGrpSpPr>
+        <p:cNvPr id="1" name=""/>
+        <p:cNvGrpSpPr/>
+        <p:nvPr/>
+      </p:nvGrpSpPr>
+      <p:grpSpPr>
+        <a:xfrm>
+          <a:off x="0" y="0"/>
+          <a:ext cx="0" cy="0"/>
+          <a:chOff x="0" y="0"/>
+          <a:chExt cx="0" cy="0"/>
+        </a:xfrm>
+      </p:grpSpPr>
+      <p:sp>
+        <p:nvSpPr>
+          <p:cNvPr id="2" name="Folienbildplatzhalter 1"/>
+          <p:cNvSpPr>
+            <a:spLocks noGrp="1" noRot="1" noChangeAspect="1"/>
+          </p:cNvSpPr>
+          <p:nvPr>
+            <p:ph type="sldImg"/>
+          </p:nvPr>
+        </p:nvSpPr>
+        <p:spPr/>
+      </p:sp>
+      <p:sp>
+        <p:nvSpPr>
+          <p:cNvPr id="3" name="Notizenplatzhalter 2"/>
+          <p:cNvSpPr>
+            <a:spLocks noGrp="1"/>
+          </p:cNvSpPr>
+          <p:nvPr>
+            <p:ph type="body" idx="1"/>
+          </p:nvPr>
+        </p:nvSpPr>
+        <p:spPr/>
+        <p:txBody>
+          <a:bodyPr/>
+          <a:lstStyle/>
+          <a:p>
+            <a:r>
+              <a:rPr lang="de-DE" dirty="0" smtClean="0"/>
+              <a:t>Formen von Sozialität: </a:t>
+            </a:r>
+            <a:r>
+              <a:rPr lang="de-DE" sz="1200" kern="1200" dirty="0" smtClean="0">
+                <a:solidFill>
+                  <a:schemeClr val="tx1"/>
+                </a:solidFill>
+                <a:effectLst/>
+                <a:latin typeface="+mn-lt"/>
+                <a:ea typeface="+mn-ea"/>
+                <a:cs typeface="+mn-cs"/>
+              </a:rPr>
+              <a:t>Zweierbeziehungen, Familien, Organisationen, Funktionssysteme, Gesellschaft</a:t>
+            </a:r>
+          </a:p>
+          <a:p>
+            <a:r>
+              <a:rPr lang="de-DE" sz="1200" kern="1200" dirty="0" smtClean="0">
+                <a:solidFill>
+                  <a:schemeClr val="tx1"/>
+                </a:solidFill>
+                <a:effectLst/>
+                <a:latin typeface="+mn-lt"/>
+                <a:ea typeface="+mn-ea"/>
+                <a:cs typeface="+mn-cs"/>
+              </a:rPr>
+              <a:t>Kohärent: zusammenhängend</a:t>
+            </a:r>
+            <a:endParaRPr lang="de-DE" dirty="0"/>
+          </a:p>
+        </p:txBody>
+      </p:sp>
+      <p:sp>
+        <p:nvSpPr>
+          <p:cNvPr id="4" name="Foliennummernplatzhalter 3"/>
+          <p:cNvSpPr>
+            <a:spLocks noGrp="1"/>
+          </p:cNvSpPr>
+          <p:nvPr>
+            <p:ph type="sldNum" sz="quarter" idx="10"/>
+          </p:nvPr>
+        </p:nvSpPr>
+        <p:spPr/>
+        <p:txBody>
+          <a:bodyPr/>
+          <a:lstStyle/>
+          <a:p>
+            <a:fld id="{291A2AE1-9A89-46FB-B262-609F9F6D1590}" type="slidenum">
+              <a:rPr lang="de-DE" smtClean="0"/>
+              <a:t>38</a:t>
+            </a:fld>
+            <a:endParaRPr lang="de-DE"/>
+          </a:p>
+        </p:txBody>
+      </p:sp>
+    </p:spTree>
+    <p:extLst>
+      <p:ext uri="{BB962C8B-B14F-4D97-AF65-F5344CB8AC3E}">
+        <p14:creationId xmlns:p14="http://schemas.microsoft.com/office/powerpoint/2010/main" val="3032600287"/>
       </p:ext>
     </p:extLst>
   </p:cSld>
@@ -1539,7 +2054,7 @@
           <a:p>
             <a:fld id="{430DCDF4-4212-41DE-881A-86CC5F4C4960}" type="datetime1">
               <a:rPr lang="en-US" smtClean="0"/>
-              <a:t>4/1/2015</a:t>
+              <a:t>4/2/2015</a:t>
             </a:fld>
             <a:endParaRPr lang="en-US" dirty="0"/>
           </a:p>
@@ -1818,7 +2333,7 @@
           <a:p>
             <a:fld id="{7D7F22C2-E00C-402C-9237-97B2DDDB1C1E}" type="datetime1">
               <a:rPr lang="en-US" smtClean="0"/>
-              <a:t>4/1/2015</a:t>
+              <a:t>4/2/2015</a:t>
             </a:fld>
             <a:endParaRPr lang="en-US" dirty="0"/>
           </a:p>
@@ -2113,7 +2628,7 @@
           <a:p>
             <a:fld id="{4751C775-F499-41CA-BB69-5F0CE1DC728B}" type="datetime1">
               <a:rPr lang="en-US" smtClean="0"/>
-              <a:t>4/1/2015</a:t>
+              <a:t>4/2/2015</a:t>
             </a:fld>
             <a:endParaRPr lang="en-US" dirty="0"/>
           </a:p>
@@ -2435,7 +2950,7 @@
           <a:p>
             <a:fld id="{EF0B729F-5E1E-40E7-8D1F-2FBC0AA7C9CD}" type="datetime1">
               <a:rPr lang="en-US" smtClean="0"/>
-              <a:t>4/1/2015</a:t>
+              <a:t>4/2/2015</a:t>
             </a:fld>
             <a:endParaRPr lang="en-US" dirty="0"/>
           </a:p>
@@ -2730,7 +3245,7 @@
           <a:p>
             <a:fld id="{6C610283-F1E1-40D0-ACF0-C635052CA35C}" type="datetime1">
               <a:rPr lang="en-US" smtClean="0"/>
-              <a:t>4/1/2015</a:t>
+              <a:t>4/2/2015</a:t>
             </a:fld>
             <a:endParaRPr lang="en-US" dirty="0"/>
           </a:p>
@@ -3104,7 +3619,7 @@
           <a:p>
             <a:fld id="{DDCC8832-2E28-430A-AD8F-583F9F33222D}" type="datetime1">
               <a:rPr lang="en-US" smtClean="0"/>
-              <a:t>4/1/2015</a:t>
+              <a:t>4/2/2015</a:t>
             </a:fld>
             <a:endParaRPr lang="en-US" dirty="0"/>
           </a:p>
@@ -3262,7 +3777,7 @@
           <a:p>
             <a:fld id="{76E487D9-92EA-4374-B9A8-0C938596B06B}" type="datetime1">
               <a:rPr lang="en-US" smtClean="0"/>
-              <a:t>4/1/2015</a:t>
+              <a:t>4/2/2015</a:t>
             </a:fld>
             <a:endParaRPr lang="en-US" dirty="0"/>
           </a:p>
@@ -3423,7 +3938,7 @@
           <a:p>
             <a:fld id="{03B2E87A-4C56-4FB1-83A8-C433C44AFBA9}" type="datetime1">
               <a:rPr lang="en-US" smtClean="0"/>
-              <a:t>4/1/2015</a:t>
+              <a:t>4/2/2015</a:t>
             </a:fld>
             <a:endParaRPr lang="en-US" dirty="0"/>
           </a:p>
@@ -3603,7 +4118,7 @@
           <a:p>
             <a:fld id="{A5828E15-EAE5-4696-A498-9462A8D07DB3}" type="datetime1">
               <a:rPr lang="en-US" smtClean="0"/>
-              <a:t>4/1/2015</a:t>
+              <a:t>4/2/2015</a:t>
             </a:fld>
             <a:endParaRPr lang="en-US" dirty="0"/>
           </a:p>
@@ -3845,7 +4360,7 @@
           <a:p>
             <a:fld id="{30C89575-A7F9-45D9-8DD0-EEE9ED1F7FA0}" type="datetime1">
               <a:rPr lang="en-US" smtClean="0"/>
-              <a:t>4/1/2015</a:t>
+              <a:t>4/2/2015</a:t>
             </a:fld>
             <a:endParaRPr lang="en-US" dirty="0"/>
           </a:p>
@@ -4065,7 +4580,7 @@
           <a:p>
             <a:fld id="{7A131F54-E68E-47BE-8946-F526F364CBA6}" type="datetime1">
               <a:rPr lang="en-US" smtClean="0"/>
-              <a:t>4/1/2015</a:t>
+              <a:t>4/2/2015</a:t>
             </a:fld>
             <a:endParaRPr lang="en-US" dirty="0"/>
           </a:p>
@@ -4420,7 +4935,7 @@
           <a:p>
             <a:fld id="{54938A4C-ABDD-4D7F-9EE8-D2212DFA111A}" type="datetime1">
               <a:rPr lang="en-US" smtClean="0"/>
-              <a:t>4/1/2015</a:t>
+              <a:t>4/2/2015</a:t>
             </a:fld>
             <a:endParaRPr lang="en-US" dirty="0"/>
           </a:p>
@@ -4524,7 +5039,7 @@
           <a:p>
             <a:fld id="{472087FD-69A5-4863-93C8-147616460B5F}" type="datetime1">
               <a:rPr lang="en-US" smtClean="0"/>
-              <a:t>4/1/2015</a:t>
+              <a:t>4/2/2015</a:t>
             </a:fld>
             <a:endParaRPr lang="en-US" dirty="0"/>
           </a:p>
@@ -4600,7 +5115,7 @@
           <a:p>
             <a:fld id="{DE67AA65-3958-4B15-93E3-62DB88057388}" type="datetime1">
               <a:rPr lang="en-US" smtClean="0"/>
-              <a:t>4/1/2015</a:t>
+              <a:t>4/2/2015</a:t>
             </a:fld>
             <a:endParaRPr lang="en-US" dirty="0"/>
           </a:p>
@@ -4836,7 +5351,7 @@
           <a:p>
             <a:fld id="{3A3AF593-EE7A-4564-A95B-6C86BAEF9839}" type="datetime1">
               <a:rPr lang="en-US" smtClean="0"/>
-              <a:t>4/1/2015</a:t>
+              <a:t>4/2/2015</a:t>
             </a:fld>
             <a:endParaRPr lang="en-US" dirty="0"/>
           </a:p>
@@ -5080,7 +5595,7 @@
           <a:p>
             <a:fld id="{D226D4E0-B61D-4B17-878D-83CEB6B35F48}" type="datetime1">
               <a:rPr lang="en-US" smtClean="0"/>
-              <a:t>4/1/2015</a:t>
+              <a:t>4/2/2015</a:t>
             </a:fld>
             <a:endParaRPr lang="en-US" dirty="0"/>
           </a:p>
@@ -5804,7 +6319,7 @@
           <a:p>
             <a:fld id="{FA7EC809-ED1F-4983-9906-520EA3F002C5}" type="datetime1">
               <a:rPr lang="en-US" smtClean="0"/>
-              <a:t>4/1/2015</a:t>
+              <a:t>4/2/2015</a:t>
             </a:fld>
             <a:endParaRPr lang="en-US" dirty="0"/>
           </a:p>
@@ -6473,7 +6988,7 @@
           <a:p>
             <a:fld id="{B68A97D9-23A2-4961-BD27-93DAEBE0E1E1}" type="datetime2">
               <a:rPr lang="de-DE" smtClean="0"/>
-              <a:t>Mittwoch, 1. April 2015</a:t>
+              <a:t>Donnerstag, 2. April 2015</a:t>
             </a:fld>
             <a:endParaRPr lang="de-DE" dirty="0"/>
           </a:p>
@@ -6588,7 +7103,6 @@
               <a:rPr lang="de-DE" dirty="0"/>
               <a:t>Administrations- und Managementlehre</a:t>
             </a:r>
-            <a:endParaRPr lang="de-DE" dirty="0"/>
           </a:p>
         </p:txBody>
       </p:sp>
@@ -6608,28 +7122,48 @@
           <a:lstStyle/>
           <a:p>
             <a:r>
+              <a:rPr lang="de-DE" dirty="0" smtClean="0"/>
+              <a:t>Behandelt Fragen </a:t>
+            </a:r>
+            <a:r>
               <a:rPr lang="de-DE" dirty="0"/>
-              <a:t>Fragen der Aufgaben- und Abteilungsbildung und der Koordination im </a:t>
-            </a:r>
-            <a:r>
-              <a:rPr lang="de-DE" dirty="0" smtClean="0"/>
-              <a:t>Mittelpunkt</a:t>
-            </a:r>
-          </a:p>
-          <a:p>
-            <a:pPr marL="342900" lvl="2" indent="-342900"/>
+              <a:t>der </a:t>
+            </a:r>
+            <a:endParaRPr lang="de-DE" dirty="0" smtClean="0"/>
+          </a:p>
+          <a:p>
+            <a:pPr lvl="1"/>
+            <a:r>
+              <a:rPr lang="de-DE" dirty="0" smtClean="0"/>
+              <a:t>Aufgaben- </a:t>
+            </a:r>
             <a:r>
               <a:rPr lang="de-DE" dirty="0"/>
-              <a:t>Fragen der Verwaltung und Probleme der Unternehmensführung</a:t>
+              <a:t>und Abteilungsbildung und der Koordination </a:t>
+            </a:r>
+            <a:endParaRPr lang="de-DE" dirty="0" smtClean="0"/>
+          </a:p>
+          <a:p>
+            <a:pPr lvl="1"/>
+            <a:r>
+              <a:rPr lang="de-DE" dirty="0" smtClean="0"/>
+              <a:t>Verwaltung </a:t>
+            </a:r>
+            <a:r>
+              <a:rPr lang="de-DE" dirty="0"/>
+              <a:t>und Probleme der Unternehmensführung</a:t>
             </a:r>
             <a:endParaRPr lang="de-DE" sz="2400" dirty="0"/>
           </a:p>
           <a:p>
             <a:r>
+              <a:rPr lang="de-DE" dirty="0" smtClean="0"/>
+              <a:t>Hat den Grundsatz </a:t>
+            </a:r>
+            <a:r>
               <a:rPr lang="de-DE" dirty="0"/>
-              <a:t>Grundsatz der Einheit der Auftragserteilung</a:t>
-            </a:r>
-            <a:endParaRPr lang="de-DE" dirty="0"/>
+              <a:t>der Einheit der Auftragserteilung</a:t>
+            </a:r>
           </a:p>
         </p:txBody>
       </p:sp>
@@ -6718,7 +7252,6 @@
               <a:rPr lang="de-DE" dirty="0"/>
               <a:t>Betriebswirtschaftliche Organisationslehre</a:t>
             </a:r>
-            <a:endParaRPr lang="de-DE" dirty="0"/>
           </a:p>
         </p:txBody>
       </p:sp>
@@ -6866,8 +7399,13 @@
             </a:r>
             <a:r>
               <a:rPr lang="de-DE" dirty="0" smtClean="0"/>
-              <a:t>=&gt; Arbeitsprozesse werden analysiert und effizienter 	gestaltet</a:t>
-            </a:r>
+              <a:t>=&gt; Arbeitsprozesse werden analysiert und effizienter 	</a:t>
+            </a:r>
+            <a:r>
+              <a:rPr lang="de-DE" dirty="0" smtClean="0"/>
+              <a:t>		gestaltet</a:t>
+            </a:r>
+            <a:endParaRPr lang="de-DE" dirty="0" smtClean="0"/>
           </a:p>
           <a:p>
             <a:r>
@@ -7249,16 +7787,42 @@
         </p:nvSpPr>
         <p:spPr/>
         <p:txBody>
-          <a:bodyPr/>
-          <a:lstStyle/>
-          <a:p>
-            <a:r>
-              <a:rPr lang="de-DE" dirty="0" smtClean="0"/>
-              <a:t>Leitende Fragestellung: Wie verhalten sich Menschen als Individuen </a:t>
+          <a:bodyPr>
+            <a:normAutofit lnSpcReduction="10000"/>
+          </a:bodyPr>
+          <a:lstStyle/>
+          <a:p>
+            <a:r>
+              <a:rPr lang="de-DE" dirty="0" smtClean="0"/>
+              <a:t>Leitende Fragestellung: </a:t>
+            </a:r>
+            <a:endParaRPr lang="de-DE" dirty="0" smtClean="0"/>
+          </a:p>
+          <a:p>
+            <a:pPr lvl="1"/>
+            <a:r>
+              <a:rPr lang="de-DE" dirty="0" smtClean="0"/>
+              <a:t>Wie </a:t>
+            </a:r>
+            <a:r>
+              <a:rPr lang="de-DE" dirty="0" smtClean="0"/>
+              <a:t>verhalten sich Menschen als Individuen </a:t>
             </a:r>
             <a:r>
               <a:rPr lang="de-DE" dirty="0"/>
-              <a:t>, in Gruppen, in Organisationseinheiten und in ganzen Organisationen aufgrund ihres Wahrnehmens, Denkens und </a:t>
+              <a:t>, in Gruppen, in Organisationseinheiten und in ganzen Organisationen </a:t>
+            </a:r>
+            <a:endParaRPr lang="de-DE" dirty="0" smtClean="0"/>
+          </a:p>
+          <a:p>
+            <a:pPr lvl="1"/>
+            <a:r>
+              <a:rPr lang="de-DE" dirty="0" smtClean="0"/>
+              <a:t>aufgrund </a:t>
+            </a:r>
+            <a:r>
+              <a:rPr lang="de-DE" dirty="0"/>
+              <a:t>ihres Wahrnehmens, Denkens und </a:t>
             </a:r>
             <a:r>
               <a:rPr lang="de-DE" dirty="0" smtClean="0"/>
@@ -7389,62 +7953,42 @@
         <p:spPr/>
         <p:txBody>
           <a:bodyPr>
-            <a:normAutofit fontScale="92500" lnSpcReduction="20000"/>
+            <a:noAutofit/>
           </a:bodyPr>
           <a:lstStyle/>
           <a:p>
             <a:r>
-              <a:rPr lang="de-DE" sz="3000" dirty="0" smtClean="0"/>
+              <a:rPr lang="de-DE" dirty="0" smtClean="0"/>
               <a:t>Untersuchung der </a:t>
             </a:r>
             <a:r>
-              <a:rPr lang="de-DE" sz="3000" dirty="0"/>
+              <a:rPr lang="de-DE" dirty="0"/>
               <a:t>Wirkungen der Arbeitsbedingungen auf die Arbeitsleistung </a:t>
             </a:r>
-            <a:endParaRPr lang="de-DE" sz="3000" dirty="0" smtClean="0"/>
-          </a:p>
-          <a:p>
-            <a:r>
-              <a:rPr lang="de-DE" sz="3000" dirty="0" smtClean="0"/>
-              <a:t>Kernaussage: Mensch ist ein soziales Wesen und funktioniert nach eigenen Gesetzen</a:t>
-            </a:r>
-          </a:p>
-          <a:p>
-            <a:r>
-              <a:rPr lang="de-DE" sz="3000" dirty="0" smtClean="0"/>
-              <a:t>Folgerung: </a:t>
-            </a:r>
-            <a:r>
-              <a:rPr lang="de-DE" sz="3000" dirty="0"/>
-              <a:t>eine positive Einstellung gegenüber der Arbeit </a:t>
-            </a:r>
-            <a:r>
-              <a:rPr lang="de-DE" sz="3000" dirty="0" smtClean="0"/>
-              <a:t>führt bei </a:t>
-            </a:r>
-            <a:r>
-              <a:rPr lang="de-DE" sz="3000" dirty="0"/>
-              <a:t>den Mitgliedern der Organisation und den Vorgesetzten zu einer hohen Zufriedenheit </a:t>
-            </a:r>
-            <a:endParaRPr lang="de-DE" sz="3000" dirty="0" smtClean="0"/>
-          </a:p>
-          <a:p>
-            <a:pPr marL="342900" lvl="2" indent="-342900"/>
-            <a:r>
-              <a:rPr lang="de-DE" sz="3000" dirty="0"/>
-              <a:t>Zufriedenheit </a:t>
-            </a:r>
-            <a:r>
-              <a:rPr lang="de-DE" sz="3000" dirty="0" smtClean="0"/>
-              <a:t>wiederum bewirkt eine </a:t>
-            </a:r>
-            <a:r>
-              <a:rPr lang="de-DE" sz="3000" dirty="0"/>
-              <a:t>hohe Arbeitsleistung</a:t>
-            </a:r>
-          </a:p>
-          <a:p>
-            <a:endParaRPr lang="de-DE" dirty="0"/>
+            <a:endParaRPr lang="de-DE" dirty="0" smtClean="0"/>
+          </a:p>
+          <a:p>
+            <a:r>
+              <a:rPr lang="de-DE" dirty="0" smtClean="0"/>
+              <a:t>Kernaussage: </a:t>
+            </a:r>
+            <a:endParaRPr lang="de-DE" dirty="0" smtClean="0"/>
+          </a:p>
+          <a:p>
+            <a:pPr lvl="1"/>
+            <a:r>
+              <a:rPr lang="de-DE" dirty="0" smtClean="0"/>
+              <a:t>Mensch </a:t>
+            </a:r>
+            <a:r>
+              <a:rPr lang="de-DE" dirty="0" smtClean="0"/>
+              <a:t>ist ein soziales Wesen und funktioniert nach eigenen </a:t>
+            </a:r>
+            <a:r>
+              <a:rPr lang="de-DE" dirty="0" smtClean="0"/>
+              <a:t>Gesetzen</a:t>
+            </a:r>
+            <a:endParaRPr lang="de-DE" dirty="0" smtClean="0"/>
           </a:p>
         </p:txBody>
       </p:sp>
@@ -7524,72 +8068,57 @@
           <a:lstStyle/>
           <a:p>
             <a:r>
-              <a:rPr lang="de-DE" dirty="0" smtClean="0"/>
-              <a:t>Verhaltensorientierte </a:t>
-            </a:r>
-            <a:r>
               <a:rPr lang="de-DE" dirty="0"/>
-              <a:t>Ansätze </a:t>
-            </a:r>
-            <a:r>
-              <a:rPr lang="de-DE" dirty="0" smtClean="0"/>
-              <a:t>-Organisationsentwicklung</a:t>
-            </a:r>
+              <a:t>Verhaltensorientierte Ansätze - Human Relations Ansatz</a:t>
+            </a:r>
+          </a:p>
+        </p:txBody>
+      </p:sp>
+      <p:sp>
+        <p:nvSpPr>
+          <p:cNvPr id="3" name="Inhaltsplatzhalter 2"/>
+          <p:cNvSpPr>
+            <a:spLocks noGrp="1"/>
+          </p:cNvSpPr>
+          <p:nvPr>
+            <p:ph idx="1"/>
+          </p:nvPr>
+        </p:nvSpPr>
+        <p:spPr/>
+        <p:txBody>
+          <a:bodyPr/>
+          <a:lstStyle/>
+          <a:p>
+            <a:r>
+              <a:rPr lang="de-DE" dirty="0"/>
+              <a:t>Folgerung: </a:t>
+            </a:r>
+          </a:p>
+          <a:p>
+            <a:pPr lvl="1"/>
+            <a:r>
+              <a:rPr lang="de-DE" dirty="0"/>
+              <a:t>eine positive Einstellung gegenüber der Arbeit führt bei den Mitgliedern der Organisation und den Vorgesetzten zu einer hohen Zufriedenheit </a:t>
+            </a:r>
+          </a:p>
+          <a:p>
+            <a:pPr marL="342900" lvl="2" indent="-342900"/>
+            <a:r>
+              <a:rPr lang="de-DE" dirty="0"/>
+              <a:t>Ergebnis:</a:t>
+            </a:r>
+          </a:p>
+          <a:p>
+            <a:pPr marL="800100" lvl="3" indent="-342900"/>
+            <a:r>
+              <a:rPr lang="de-DE" dirty="0"/>
+              <a:t>Zufriedenheit wiederum bewirkt eine hohe Arbeitsleistung</a:t>
+            </a:r>
+          </a:p>
+          <a:p>
             <a:endParaRPr lang="de-DE" dirty="0"/>
           </a:p>
-        </p:txBody>
-      </p:sp>
-      <p:sp>
-        <p:nvSpPr>
-          <p:cNvPr id="3" name="Inhaltsplatzhalter 2"/>
-          <p:cNvSpPr>
-            <a:spLocks noGrp="1"/>
-          </p:cNvSpPr>
-          <p:nvPr>
-            <p:ph idx="1"/>
-          </p:nvPr>
-        </p:nvSpPr>
-        <p:spPr/>
-        <p:txBody>
-          <a:bodyPr/>
-          <a:lstStyle/>
-          <a:p>
-            <a:r>
-              <a:rPr lang="de-DE" dirty="0"/>
-              <a:t>gründet auf Erkenntnissen aus der gruppendynamischen </a:t>
-            </a:r>
-            <a:r>
-              <a:rPr lang="de-DE" dirty="0" err="1" smtClean="0"/>
-              <a:t>Laboratoriumsmethode</a:t>
-            </a:r>
-            <a:r>
-              <a:rPr lang="de-DE" dirty="0" smtClean="0"/>
-              <a:t> </a:t>
-            </a:r>
-            <a:r>
-              <a:rPr lang="de-DE" dirty="0"/>
-              <a:t>und dem </a:t>
-            </a:r>
-            <a:r>
-              <a:rPr lang="de-DE" dirty="0" smtClean="0"/>
-              <a:t>Survey-Feedback</a:t>
-            </a:r>
-          </a:p>
-          <a:p>
-            <a:r>
-              <a:rPr lang="de-DE" dirty="0" smtClean="0"/>
-              <a:t>Kernkonzept: „Betroffene zu Beteiligten machen“</a:t>
-            </a:r>
-          </a:p>
-          <a:p>
-            <a:r>
-              <a:rPr lang="de-DE" dirty="0"/>
-              <a:t>Durch "geplanten sozialen Wandel" werden die Fähigkeiten aller Beteiligten und der Organisation als Ganzes für Entwicklung und Veränderung </a:t>
-            </a:r>
-            <a:r>
-              <a:rPr lang="de-DE" dirty="0" err="1"/>
-              <a:t>genutz</a:t>
-            </a:r>
+          <a:p>
             <a:endParaRPr lang="de-DE" dirty="0"/>
           </a:p>
         </p:txBody>
@@ -7620,13 +8149,20 @@
     </p:spTree>
     <p:extLst>
       <p:ext uri="{BB962C8B-B14F-4D97-AF65-F5344CB8AC3E}">
-        <p14:creationId xmlns:p14="http://schemas.microsoft.com/office/powerpoint/2010/main" val="2945959651"/>
+        <p14:creationId xmlns:p14="http://schemas.microsoft.com/office/powerpoint/2010/main" val="2533316703"/>
       </p:ext>
     </p:extLst>
   </p:cSld>
   <p:clrMapOvr>
     <a:masterClrMapping/>
   </p:clrMapOvr>
+  <p:timing>
+    <p:tnLst>
+      <p:par>
+        <p:cTn id="1" dur="indefinite" restart="never" nodeType="tmRoot"/>
+      </p:par>
+    </p:tnLst>
+  </p:timing>
 </p:sld>
 </file>
 
@@ -7663,9 +8199,18 @@
           <a:lstStyle/>
           <a:p>
             <a:r>
+              <a:rPr lang="de-DE" dirty="0" smtClean="0"/>
+              <a:t>Verhaltensorientierte </a:t>
+            </a:r>
+            <a:r>
               <a:rPr lang="de-DE" dirty="0"/>
-              <a:t>Verhaltensorientierte Ansätze -Organisationsentwicklung</a:t>
-            </a:r>
+              <a:t>Ansätze </a:t>
+            </a:r>
+            <a:r>
+              <a:rPr lang="de-DE" dirty="0" smtClean="0"/>
+              <a:t>-Organisationsentwicklung</a:t>
+            </a:r>
+            <a:endParaRPr lang="de-DE" dirty="0"/>
           </a:p>
         </p:txBody>
       </p:sp>
@@ -7681,32 +8226,68 @@
         </p:nvSpPr>
         <p:spPr/>
         <p:txBody>
-          <a:bodyPr/>
-          <a:lstStyle/>
-          <a:p>
-            <a:pPr marL="342900" lvl="2" indent="-342900"/>
+          <a:bodyPr>
+            <a:normAutofit lnSpcReduction="10000"/>
+          </a:bodyPr>
+          <a:lstStyle/>
+          <a:p>
             <a:r>
               <a:rPr lang="de-DE" dirty="0"/>
-              <a:t>Gesetzmäßigkeiten sozialer Gemeinschaften </a:t>
-            </a:r>
-            <a:r>
-              <a:rPr lang="de-DE" dirty="0" smtClean="0"/>
-              <a:t>werden genutzt</a:t>
-            </a:r>
-            <a:endParaRPr lang="de-DE" sz="2400" dirty="0"/>
-          </a:p>
-          <a:p>
-            <a:pPr marL="342900" lvl="2" indent="-342900"/>
+              <a:t>G</a:t>
+            </a:r>
+            <a:r>
+              <a:rPr lang="de-DE" dirty="0" smtClean="0"/>
+              <a:t>ründet </a:t>
+            </a:r>
             <a:r>
               <a:rPr lang="de-DE" dirty="0"/>
-              <a:t>Interessen der Mitarbeiter berücksichtigt</a:t>
-            </a:r>
-            <a:endParaRPr lang="de-DE" sz="2400" dirty="0"/>
-          </a:p>
-          <a:p>
-            <a:pPr marL="0" indent="0">
-              <a:buNone/>
-            </a:pPr>
+              <a:t>auf Erkenntnissen aus der gruppendynamischen </a:t>
+            </a:r>
+            <a:r>
+              <a:rPr lang="de-DE" dirty="0" err="1" smtClean="0"/>
+              <a:t>Laboratoriumsmethode</a:t>
+            </a:r>
+            <a:r>
+              <a:rPr lang="de-DE" dirty="0" smtClean="0"/>
+              <a:t> </a:t>
+            </a:r>
+            <a:r>
+              <a:rPr lang="de-DE" dirty="0"/>
+              <a:t>und dem </a:t>
+            </a:r>
+            <a:r>
+              <a:rPr lang="de-DE" dirty="0" smtClean="0"/>
+              <a:t>Survey-Feedback</a:t>
+            </a:r>
+          </a:p>
+          <a:p>
+            <a:r>
+              <a:rPr lang="de-DE" dirty="0" smtClean="0"/>
+              <a:t>Kernkonzept: </a:t>
+            </a:r>
+            <a:endParaRPr lang="de-DE" dirty="0" smtClean="0"/>
+          </a:p>
+          <a:p>
+            <a:pPr lvl="1"/>
+            <a:r>
+              <a:rPr lang="de-DE" dirty="0" smtClean="0"/>
+              <a:t>„</a:t>
+            </a:r>
+            <a:r>
+              <a:rPr lang="de-DE" dirty="0" smtClean="0"/>
+              <a:t>Betroffene zu Beteiligten machen“</a:t>
+            </a:r>
+          </a:p>
+          <a:p>
+            <a:pPr lvl="1"/>
+            <a:r>
+              <a:rPr lang="de-DE" dirty="0"/>
+              <a:t>Durch "geplanten sozialen Wandel" werden die Fähigkeiten aller Beteiligten und der Organisation als Ganzes für Entwicklung und Veränderung </a:t>
+            </a:r>
+            <a:r>
+              <a:rPr lang="de-DE" dirty="0" smtClean="0"/>
+              <a:t>genutzt</a:t>
+            </a:r>
             <a:endParaRPr lang="de-DE" dirty="0"/>
           </a:p>
         </p:txBody>
@@ -7737,13 +8318,20 @@
     </p:spTree>
     <p:extLst>
       <p:ext uri="{BB962C8B-B14F-4D97-AF65-F5344CB8AC3E}">
-        <p14:creationId xmlns:p14="http://schemas.microsoft.com/office/powerpoint/2010/main" val="2715043182"/>
+        <p14:creationId xmlns:p14="http://schemas.microsoft.com/office/powerpoint/2010/main" val="2945959651"/>
       </p:ext>
     </p:extLst>
   </p:cSld>
   <p:clrMapOvr>
     <a:masterClrMapping/>
   </p:clrMapOvr>
+  <p:timing>
+    <p:tnLst>
+      <p:par>
+        <p:cTn id="1" dur="indefinite" restart="never" nodeType="tmRoot"/>
+      </p:par>
+    </p:tnLst>
+  </p:timing>
 </p:sld>
 </file>
 
@@ -7781,17 +8369,8 @@
           <a:p>
             <a:r>
               <a:rPr lang="de-DE" dirty="0"/>
-              <a:t>Verhaltensorientierte Ansätze </a:t>
-            </a:r>
-            <a:r>
-              <a:rPr lang="de-DE" dirty="0" smtClean="0"/>
-              <a:t>– Motivationsorientierte </a:t>
-            </a:r>
-            <a:r>
-              <a:rPr lang="de-DE" dirty="0" err="1" smtClean="0"/>
-              <a:t>Ansätz</a:t>
-            </a:r>
-            <a:endParaRPr lang="de-DE" dirty="0"/>
+              <a:t>Verhaltensorientierte Ansätze -Organisationsentwicklung</a:t>
+            </a:r>
           </a:p>
         </p:txBody>
       </p:sp>
@@ -7810,16 +8389,29 @@
           <a:bodyPr/>
           <a:lstStyle/>
           <a:p>
-            <a:r>
-              <a:rPr lang="de-DE" dirty="0" smtClean="0"/>
-              <a:t>Haben menschliches Verhalten als Gegenstand</a:t>
-            </a:r>
-          </a:p>
-          <a:p>
+            <a:pPr marL="342900" lvl="2" indent="-342900"/>
             <a:r>
               <a:rPr lang="de-DE" dirty="0"/>
-              <a:t>Zusammenhang zwischen Motivation bzw. Frustration, Zufriedenheit und Leistung</a:t>
-            </a:r>
+              <a:t>Gesetzmäßigkeiten sozialer Gemeinschaften </a:t>
+            </a:r>
+            <a:r>
+              <a:rPr lang="de-DE" dirty="0" smtClean="0"/>
+              <a:t>werden genutzt</a:t>
+            </a:r>
+            <a:endParaRPr lang="de-DE" sz="2400" dirty="0"/>
+          </a:p>
+          <a:p>
+            <a:pPr marL="342900" lvl="2" indent="-342900"/>
+            <a:r>
+              <a:rPr lang="de-DE" dirty="0"/>
+              <a:t>Interessen der Mitarbeiter berücksichtigt</a:t>
+            </a:r>
+            <a:endParaRPr lang="de-DE" sz="2400" dirty="0"/>
+          </a:p>
+          <a:p>
+            <a:pPr marL="0" indent="0">
+              <a:buNone/>
+            </a:pPr>
             <a:endParaRPr lang="de-DE" dirty="0"/>
           </a:p>
         </p:txBody>
@@ -7850,13 +8442,20 @@
     </p:spTree>
     <p:extLst>
       <p:ext uri="{BB962C8B-B14F-4D97-AF65-F5344CB8AC3E}">
-        <p14:creationId xmlns:p14="http://schemas.microsoft.com/office/powerpoint/2010/main" val="3917483911"/>
+        <p14:creationId xmlns:p14="http://schemas.microsoft.com/office/powerpoint/2010/main" val="2715043182"/>
       </p:ext>
     </p:extLst>
   </p:cSld>
   <p:clrMapOvr>
     <a:masterClrMapping/>
   </p:clrMapOvr>
+  <p:timing>
+    <p:tnLst>
+      <p:par>
+        <p:cTn id="1" dur="indefinite" restart="never" nodeType="tmRoot"/>
+      </p:par>
+    </p:tnLst>
+  </p:timing>
 </p:sld>
 </file>
 
@@ -8034,7 +8633,11 @@
             </a:r>
             <a:r>
               <a:rPr lang="de-DE" dirty="0" smtClean="0"/>
-              <a:t>– Ästhetischer Ansatz</a:t>
+              <a:t>– Motivationsorientierte </a:t>
+            </a:r>
+            <a:r>
+              <a:rPr lang="de-DE" dirty="0" smtClean="0"/>
+              <a:t>Ansätze</a:t>
             </a:r>
             <a:endParaRPr lang="de-DE" dirty="0"/>
           </a:p>
@@ -8056,38 +8659,19 @@
           <a:lstStyle/>
           <a:p>
             <a:r>
+              <a:rPr lang="de-DE" dirty="0" smtClean="0"/>
+              <a:t>Haben menschliches Verhalten als Gegenstand</a:t>
+            </a:r>
+          </a:p>
+          <a:p>
+            <a:r>
               <a:rPr lang="de-DE" dirty="0"/>
-              <a:t>U</a:t>
-            </a:r>
-            <a:r>
-              <a:rPr lang="de-DE" dirty="0" smtClean="0"/>
-              <a:t>ntersucht </a:t>
-            </a:r>
-            <a:r>
-              <a:rPr lang="de-DE" dirty="0"/>
-              <a:t>die ästhetische Wahrnehmung in und von </a:t>
-            </a:r>
-            <a:r>
-              <a:rPr lang="de-DE" dirty="0" smtClean="0"/>
-              <a:t>Organisationen</a:t>
-            </a:r>
-          </a:p>
-          <a:p>
-            <a:pPr marL="342900" lvl="2" indent="-342900"/>
-            <a:r>
-              <a:rPr lang="de-DE" dirty="0"/>
-              <a:t>Ästhetik gemäß der Grundbedeutung als "sinnliche Wahrnehmung"</a:t>
-            </a:r>
-            <a:endParaRPr lang="de-DE" sz="2400" dirty="0"/>
-          </a:p>
-          <a:p>
-            <a:pPr marL="342900" lvl="2" indent="-342900"/>
-            <a:r>
-              <a:rPr lang="de-DE" dirty="0"/>
-              <a:t>Organisationen nicht ausschließlich als kognitives Konstrukt</a:t>
-            </a:r>
-          </a:p>
-          <a:p>
+              <a:t>Zusammenhang zwischen Motivation bzw. Frustration, Zufriedenheit und </a:t>
+            </a:r>
+            <a:r>
+              <a:rPr lang="de-DE" dirty="0" smtClean="0"/>
+              <a:t>Leistung wird untersucht</a:t>
+            </a:r>
             <a:endParaRPr lang="de-DE" dirty="0"/>
           </a:p>
         </p:txBody>
@@ -8118,13 +8702,20 @@
     </p:spTree>
     <p:extLst>
       <p:ext uri="{BB962C8B-B14F-4D97-AF65-F5344CB8AC3E}">
-        <p14:creationId xmlns:p14="http://schemas.microsoft.com/office/powerpoint/2010/main" val="3114071066"/>
+        <p14:creationId xmlns:p14="http://schemas.microsoft.com/office/powerpoint/2010/main" val="3917483911"/>
       </p:ext>
     </p:extLst>
   </p:cSld>
   <p:clrMapOvr>
     <a:masterClrMapping/>
   </p:clrMapOvr>
+  <p:timing>
+    <p:tnLst>
+      <p:par>
+        <p:cTn id="1" dur="indefinite" restart="never" nodeType="tmRoot"/>
+      </p:par>
+    </p:tnLst>
+  </p:timing>
 </p:sld>
 </file>
 
@@ -8162,8 +8753,13 @@
           <a:p>
             <a:r>
               <a:rPr lang="de-DE" dirty="0"/>
-              <a:t>Verhaltensorientierte Ansätze – Ästhetischer Ansatz</a:t>
-            </a:r>
+              <a:t>Verhaltensorientierte Ansätze </a:t>
+            </a:r>
+            <a:r>
+              <a:rPr lang="de-DE" dirty="0" smtClean="0"/>
+              <a:t>– Ästhetischer Ansatz</a:t>
+            </a:r>
+            <a:endParaRPr lang="de-DE" dirty="0"/>
           </a:p>
         </p:txBody>
       </p:sp>
@@ -8182,27 +8778,52 @@
           <a:bodyPr/>
           <a:lstStyle/>
           <a:p>
+            <a:r>
+              <a:rPr lang="de-DE" dirty="0"/>
+              <a:t>U</a:t>
+            </a:r>
+            <a:r>
+              <a:rPr lang="de-DE" dirty="0" smtClean="0"/>
+              <a:t>ntersucht </a:t>
+            </a:r>
+            <a:r>
+              <a:rPr lang="de-DE" dirty="0"/>
+              <a:t>die ästhetische Wahrnehmung in und von </a:t>
+            </a:r>
+            <a:r>
+              <a:rPr lang="de-DE" dirty="0" smtClean="0"/>
+              <a:t>Organisationen</a:t>
+            </a:r>
+          </a:p>
+          <a:p>
             <a:pPr marL="342900" lvl="2" indent="-342900"/>
             <a:r>
-              <a:rPr lang="de-DE" dirty="0" smtClean="0"/>
-              <a:t>Annahme: </a:t>
-            </a:r>
-            <a:r>
               <a:rPr lang="de-DE" dirty="0"/>
-              <a:t>Organisationsteilnehmer </a:t>
-            </a:r>
-            <a:r>
-              <a:rPr lang="de-DE" dirty="0" smtClean="0"/>
-              <a:t>reagieren nicht </a:t>
-            </a:r>
+              <a:t>Ästhetik gemäß der Grundbedeutung als "sinnliche Wahrnehmung"</a:t>
+            </a:r>
+            <a:endParaRPr lang="de-DE" sz="2400" dirty="0"/>
+          </a:p>
+          <a:p>
+            <a:pPr marL="342900" lvl="2" indent="-342900"/>
             <a:r>
               <a:rPr lang="de-DE" dirty="0"/>
-              <a:t>nur rein rational, sondern körperlich-ästhetisch auf Architektur, Arbeitsplatzgestaltung, Atmosphäre und vor allem Teams und </a:t>
-            </a:r>
-            <a:r>
-              <a:rPr lang="de-DE" dirty="0" smtClean="0"/>
-              <a:t>Führung</a:t>
-            </a:r>
+              <a:t>Organisationen </a:t>
+            </a:r>
+            <a:r>
+              <a:rPr lang="de-DE" dirty="0" smtClean="0"/>
+              <a:t>werden nicht </a:t>
+            </a:r>
+            <a:r>
+              <a:rPr lang="de-DE" dirty="0"/>
+              <a:t>ausschließlich als kognitives </a:t>
+            </a:r>
+            <a:r>
+              <a:rPr lang="de-DE" dirty="0" smtClean="0"/>
+              <a:t>Konstrukt betrachtet</a:t>
+            </a:r>
+            <a:endParaRPr lang="de-DE" dirty="0"/>
+          </a:p>
+          <a:p>
             <a:endParaRPr lang="de-DE" dirty="0"/>
           </a:p>
         </p:txBody>
@@ -8233,13 +8854,20 @@
     </p:spTree>
     <p:extLst>
       <p:ext uri="{BB962C8B-B14F-4D97-AF65-F5344CB8AC3E}">
-        <p14:creationId xmlns:p14="http://schemas.microsoft.com/office/powerpoint/2010/main" val="336095797"/>
+        <p14:creationId xmlns:p14="http://schemas.microsoft.com/office/powerpoint/2010/main" val="3114071066"/>
       </p:ext>
     </p:extLst>
   </p:cSld>
   <p:clrMapOvr>
     <a:masterClrMapping/>
   </p:clrMapOvr>
+  <p:timing>
+    <p:tnLst>
+      <p:par>
+        <p:cTn id="1" dur="indefinite" restart="never" nodeType="tmRoot"/>
+      </p:par>
+    </p:tnLst>
+  </p:timing>
 </p:sld>
 </file>
 
@@ -8277,13 +8905,8 @@
           <a:p>
             <a:r>
               <a:rPr lang="de-DE" dirty="0"/>
-              <a:t>Verhaltensorientierte Ansätze </a:t>
-            </a:r>
-            <a:r>
-              <a:rPr lang="de-DE" dirty="0" smtClean="0"/>
-              <a:t>– Berücksichtigung der Motivation</a:t>
-            </a:r>
-            <a:endParaRPr lang="de-DE" dirty="0"/>
+              <a:t>Verhaltensorientierte Ansätze – Ästhetischer Ansatz</a:t>
+            </a:r>
           </a:p>
         </p:txBody>
       </p:sp>
@@ -8302,30 +8925,71 @@
           <a:bodyPr/>
           <a:lstStyle/>
           <a:p>
-            <a:r>
-              <a:rPr lang="de-DE" dirty="0" smtClean="0"/>
-              <a:t>Menschliche Bedürfnisse werden beachtet</a:t>
-            </a:r>
-          </a:p>
-          <a:p>
-            <a:r>
-              <a:rPr lang="de-DE" dirty="0" smtClean="0"/>
-              <a:t>Erstmalig Mensch im Mittelpunkt der Betrachtung</a:t>
-            </a:r>
-          </a:p>
-          <a:p>
-            <a:r>
-              <a:rPr lang="de-DE" dirty="0" smtClean="0"/>
-              <a:t>Mensch ist ein soziales Wesen </a:t>
-            </a:r>
-          </a:p>
-          <a:p>
-            <a:r>
-              <a:rPr lang="de-DE" dirty="0" smtClean="0"/>
-              <a:t>Menschliches Verhalten sehr komplex =&gt; kein verallgemeinerbarer Erfolg möglich</a:t>
-            </a:r>
-          </a:p>
-          <a:p>
+            <a:pPr marL="342900" lvl="2" indent="-342900"/>
+            <a:r>
+              <a:rPr lang="de-DE" dirty="0" smtClean="0"/>
+              <a:t>Annahme: </a:t>
+            </a:r>
+            <a:endParaRPr lang="de-DE" dirty="0" smtClean="0"/>
+          </a:p>
+          <a:p>
+            <a:pPr marL="800100" lvl="3" indent="-342900"/>
+            <a:r>
+              <a:rPr lang="de-DE" dirty="0" smtClean="0"/>
+              <a:t> Organisationsteilnehmer </a:t>
+            </a:r>
+            <a:r>
+              <a:rPr lang="de-DE" dirty="0" smtClean="0"/>
+              <a:t>reagieren nicht </a:t>
+            </a:r>
+            <a:r>
+              <a:rPr lang="de-DE" dirty="0"/>
+              <a:t>nur rein </a:t>
+            </a:r>
+            <a:r>
+              <a:rPr lang="de-DE" dirty="0" smtClean="0"/>
+              <a:t>   rational</a:t>
+            </a:r>
+            <a:r>
+              <a:rPr lang="de-DE" dirty="0"/>
+              <a:t>, </a:t>
+            </a:r>
+            <a:endParaRPr lang="de-DE" dirty="0" smtClean="0"/>
+          </a:p>
+          <a:p>
+            <a:pPr marL="457200" lvl="3" indent="0">
+              <a:buNone/>
+            </a:pPr>
+            <a:r>
+              <a:rPr lang="de-DE" dirty="0"/>
+              <a:t>	</a:t>
+            </a:r>
+            <a:r>
+              <a:rPr lang="de-DE" dirty="0" smtClean="0"/>
+              <a:t>sondern </a:t>
+            </a:r>
+            <a:r>
+              <a:rPr lang="de-DE" dirty="0"/>
+              <a:t>körperlich-ästhetisch auf </a:t>
+            </a:r>
+            <a:endParaRPr lang="de-DE" dirty="0" smtClean="0"/>
+          </a:p>
+          <a:p>
+            <a:pPr marL="914400" lvl="4" indent="0">
+              <a:buNone/>
+            </a:pPr>
+            <a:r>
+              <a:rPr lang="de-DE" dirty="0" smtClean="0"/>
+              <a:t>Architektur</a:t>
+            </a:r>
+            <a:r>
+              <a:rPr lang="de-DE" dirty="0"/>
+              <a:t>, Arbeitsplatzgestaltung, Atmosphäre und vor allem Teams und </a:t>
+            </a:r>
+            <a:r>
+              <a:rPr lang="de-DE" dirty="0" smtClean="0"/>
+              <a:t>Führung</a:t>
+            </a:r>
             <a:endParaRPr lang="de-DE" dirty="0"/>
           </a:p>
         </p:txBody>
@@ -8356,13 +9020,20 @@
     </p:spTree>
     <p:extLst>
       <p:ext uri="{BB962C8B-B14F-4D97-AF65-F5344CB8AC3E}">
-        <p14:creationId xmlns:p14="http://schemas.microsoft.com/office/powerpoint/2010/main" val="3332020738"/>
+        <p14:creationId xmlns:p14="http://schemas.microsoft.com/office/powerpoint/2010/main" val="336095797"/>
       </p:ext>
     </p:extLst>
   </p:cSld>
   <p:clrMapOvr>
     <a:masterClrMapping/>
   </p:clrMapOvr>
+  <p:timing>
+    <p:tnLst>
+      <p:par>
+        <p:cTn id="1" dur="indefinite" restart="never" nodeType="tmRoot"/>
+      </p:par>
+    </p:tnLst>
+  </p:timing>
 </p:sld>
 </file>
 
@@ -8400,8 +9071,13 @@
           <a:p>
             <a:r>
               <a:rPr lang="de-DE" dirty="0"/>
-              <a:t>Verhaltensorientierte Ansätze – Berücksichtigung der Motivation</a:t>
-            </a:r>
+              <a:t>Verhaltensorientierte Ansätze </a:t>
+            </a:r>
+            <a:r>
+              <a:rPr lang="de-DE" dirty="0" smtClean="0"/>
+              <a:t>– Berücksichtigung der Motivation</a:t>
+            </a:r>
+            <a:endParaRPr lang="de-DE" dirty="0"/>
           </a:p>
         </p:txBody>
       </p:sp>
@@ -8420,25 +9096,28 @@
           <a:bodyPr/>
           <a:lstStyle/>
           <a:p>
-            <a:pPr lvl="0"/>
-            <a:r>
-              <a:rPr lang="de-DE" dirty="0"/>
-              <a:t>Betriebsklima hat mehr Einfluss auf das Arbeitsergebnis als die </a:t>
-            </a:r>
-            <a:r>
-              <a:rPr lang="de-DE" dirty="0" smtClean="0"/>
-              <a:t>Arbeitsbedingungen</a:t>
-            </a:r>
-          </a:p>
-          <a:p>
-            <a:r>
-              <a:rPr lang="de-DE" dirty="0"/>
-              <a:t>Leistungsbereitschaft gefördert durch Zufriedenheit und Motivation</a:t>
-            </a:r>
-          </a:p>
-          <a:p>
-            <a:pPr lvl="0"/>
-            <a:endParaRPr lang="de-DE" dirty="0"/>
+            <a:r>
+              <a:rPr lang="de-DE" dirty="0" smtClean="0"/>
+              <a:t>Menschliche Bedürfnisse werden beachtet</a:t>
+            </a:r>
+          </a:p>
+          <a:p>
+            <a:r>
+              <a:rPr lang="de-DE" dirty="0" smtClean="0"/>
+              <a:t>Erstmalig Mensch im Mittelpunkt der Betrachtung</a:t>
+            </a:r>
+          </a:p>
+          <a:p>
+            <a:r>
+              <a:rPr lang="de-DE" dirty="0" smtClean="0"/>
+              <a:t>Mensch ist ein soziales Wesen </a:t>
+            </a:r>
+          </a:p>
+          <a:p>
+            <a:r>
+              <a:rPr lang="de-DE" dirty="0" smtClean="0"/>
+              <a:t>Menschliches Verhalten sehr komplex =&gt; kein verallgemeinerbarer Erfolg möglich</a:t>
+            </a:r>
           </a:p>
           <a:p>
             <a:endParaRPr lang="de-DE" dirty="0"/>
@@ -8471,13 +9150,20 @@
     </p:spTree>
     <p:extLst>
       <p:ext uri="{BB962C8B-B14F-4D97-AF65-F5344CB8AC3E}">
-        <p14:creationId xmlns:p14="http://schemas.microsoft.com/office/powerpoint/2010/main" val="3524714940"/>
+        <p14:creationId xmlns:p14="http://schemas.microsoft.com/office/powerpoint/2010/main" val="3332020738"/>
       </p:ext>
     </p:extLst>
   </p:cSld>
   <p:clrMapOvr>
     <a:masterClrMapping/>
   </p:clrMapOvr>
+  <p:timing>
+    <p:tnLst>
+      <p:par>
+        <p:cTn id="1" dur="indefinite" restart="never" nodeType="tmRoot"/>
+      </p:par>
+    </p:tnLst>
+  </p:timing>
 </p:sld>
 </file>
 
@@ -8500,7 +9186,7 @@
       </p:grpSpPr>
       <p:sp>
         <p:nvSpPr>
-          <p:cNvPr id="5" name="Titel 4"/>
+          <p:cNvPr id="2" name="Titel 1"/>
           <p:cNvSpPr>
             <a:spLocks noGrp="1"/>
           </p:cNvSpPr>
@@ -8514,29 +9200,49 @@
           <a:lstStyle/>
           <a:p>
             <a:r>
-              <a:rPr lang="de-DE" dirty="0" smtClean="0"/>
-              <a:t>Entscheidungsorientierte Ansätze</a:t>
-            </a:r>
+              <a:rPr lang="de-DE" dirty="0"/>
+              <a:t>Verhaltensorientierte Ansätze – Berücksichtigung der Motivation</a:t>
+            </a:r>
+          </a:p>
+        </p:txBody>
+      </p:sp>
+      <p:sp>
+        <p:nvSpPr>
+          <p:cNvPr id="3" name="Inhaltsplatzhalter 2"/>
+          <p:cNvSpPr>
+            <a:spLocks noGrp="1"/>
+          </p:cNvSpPr>
+          <p:nvPr>
+            <p:ph idx="1"/>
+          </p:nvPr>
+        </p:nvSpPr>
+        <p:spPr/>
+        <p:txBody>
+          <a:bodyPr/>
+          <a:lstStyle/>
+          <a:p>
+            <a:pPr lvl="0"/>
+            <a:r>
+              <a:rPr lang="de-DE" dirty="0"/>
+              <a:t>Betriebsklima hat mehr Einfluss auf das Arbeitsergebnis als die </a:t>
+            </a:r>
+            <a:r>
+              <a:rPr lang="de-DE" dirty="0" smtClean="0"/>
+              <a:t>Arbeitsbedingungen</a:t>
+            </a:r>
+          </a:p>
+          <a:p>
+            <a:r>
+              <a:rPr lang="de-DE" dirty="0"/>
+              <a:t>Leistungsbereitschaft gefördert durch Zufriedenheit und Motivation</a:t>
+            </a:r>
+          </a:p>
+          <a:p>
+            <a:pPr lvl="0"/>
             <a:endParaRPr lang="de-DE" dirty="0"/>
           </a:p>
-        </p:txBody>
-      </p:sp>
-      <p:sp>
-        <p:nvSpPr>
-          <p:cNvPr id="6" name="Textplatzhalter 5"/>
-          <p:cNvSpPr>
-            <a:spLocks noGrp="1"/>
-          </p:cNvSpPr>
-          <p:nvPr>
-            <p:ph type="body" idx="1"/>
-          </p:nvPr>
-        </p:nvSpPr>
-        <p:spPr/>
-        <p:txBody>
-          <a:bodyPr/>
-          <a:lstStyle/>
-          <a:p>
-            <a:endParaRPr lang="de-DE"/>
+          <a:p>
+            <a:endParaRPr lang="de-DE" dirty="0"/>
           </a:p>
         </p:txBody>
       </p:sp>
@@ -8566,13 +9272,20 @@
     </p:spTree>
     <p:extLst>
       <p:ext uri="{BB962C8B-B14F-4D97-AF65-F5344CB8AC3E}">
-        <p14:creationId xmlns:p14="http://schemas.microsoft.com/office/powerpoint/2010/main" val="3851671853"/>
+        <p14:creationId xmlns:p14="http://schemas.microsoft.com/office/powerpoint/2010/main" val="3524714940"/>
       </p:ext>
     </p:extLst>
   </p:cSld>
   <p:clrMapOvr>
     <a:masterClrMapping/>
   </p:clrMapOvr>
+  <p:timing>
+    <p:tnLst>
+      <p:par>
+        <p:cTn id="1" dur="indefinite" restart="never" nodeType="tmRoot"/>
+      </p:par>
+    </p:tnLst>
+  </p:timing>
 </p:sld>
 </file>
 
@@ -8609,49 +9322,29 @@
           <a:lstStyle/>
           <a:p>
             <a:r>
-              <a:rPr lang="de-DE" dirty="0"/>
+              <a:rPr lang="de-DE" dirty="0" smtClean="0"/>
               <a:t>Entscheidungsorientierte Ansätze</a:t>
             </a:r>
-          </a:p>
-        </p:txBody>
-      </p:sp>
-      <p:sp>
-        <p:nvSpPr>
-          <p:cNvPr id="6" name="Inhaltsplatzhalter 5"/>
-          <p:cNvSpPr>
-            <a:spLocks noGrp="1"/>
-          </p:cNvSpPr>
-          <p:nvPr>
-            <p:ph idx="1"/>
-          </p:nvPr>
-        </p:nvSpPr>
-        <p:spPr/>
-        <p:txBody>
-          <a:bodyPr>
-            <a:normAutofit/>
-          </a:bodyPr>
-          <a:lstStyle/>
-          <a:p>
-            <a:pPr marL="342900" lvl="1" indent="-342900"/>
-            <a:r>
-              <a:rPr lang="de-DE" dirty="0"/>
-              <a:t>Entscheidungslogisch-orientierte Ansätze</a:t>
-            </a:r>
-          </a:p>
-          <a:p>
-            <a:pPr marL="342900" lvl="1" indent="-342900"/>
-            <a:r>
-              <a:rPr lang="de-DE" dirty="0"/>
-              <a:t>Entscheidungsprozess-orientierte Ansätze</a:t>
-            </a:r>
-          </a:p>
-          <a:p>
-            <a:pPr marL="342900" lvl="1" indent="-342900"/>
-            <a:r>
-              <a:rPr lang="de-DE" dirty="0" smtClean="0"/>
-              <a:t>Berücksichtigung der Motivation</a:t>
-            </a:r>
             <a:endParaRPr lang="de-DE" dirty="0"/>
+          </a:p>
+        </p:txBody>
+      </p:sp>
+      <p:sp>
+        <p:nvSpPr>
+          <p:cNvPr id="6" name="Textplatzhalter 5"/>
+          <p:cNvSpPr>
+            <a:spLocks noGrp="1"/>
+          </p:cNvSpPr>
+          <p:nvPr>
+            <p:ph type="body" idx="1"/>
+          </p:nvPr>
+        </p:nvSpPr>
+        <p:spPr/>
+        <p:txBody>
+          <a:bodyPr/>
+          <a:lstStyle/>
+          <a:p>
+            <a:endParaRPr lang="de-DE"/>
           </a:p>
         </p:txBody>
       </p:sp>
@@ -8681,13 +9374,20 @@
     </p:spTree>
     <p:extLst>
       <p:ext uri="{BB962C8B-B14F-4D97-AF65-F5344CB8AC3E}">
-        <p14:creationId xmlns:p14="http://schemas.microsoft.com/office/powerpoint/2010/main" val="473945606"/>
+        <p14:creationId xmlns:p14="http://schemas.microsoft.com/office/powerpoint/2010/main" val="3851671853"/>
       </p:ext>
     </p:extLst>
   </p:cSld>
   <p:clrMapOvr>
     <a:masterClrMapping/>
   </p:clrMapOvr>
+  <p:timing>
+    <p:tnLst>
+      <p:par>
+        <p:cTn id="1" dur="indefinite" restart="never" nodeType="tmRoot"/>
+      </p:par>
+    </p:tnLst>
+  </p:timing>
 </p:sld>
 </file>
 
@@ -8710,12 +9410,34 @@
       </p:grpSpPr>
       <p:sp>
         <p:nvSpPr>
-          <p:cNvPr id="2" name="Titel 1"/>
+          <p:cNvPr id="5" name="Titel 4"/>
           <p:cNvSpPr>
             <a:spLocks noGrp="1"/>
           </p:cNvSpPr>
           <p:nvPr>
             <p:ph type="title"/>
+          </p:nvPr>
+        </p:nvSpPr>
+        <p:spPr/>
+        <p:txBody>
+          <a:bodyPr/>
+          <a:lstStyle/>
+          <a:p>
+            <a:r>
+              <a:rPr lang="de-DE" dirty="0"/>
+              <a:t>Entscheidungsorientierte Ansätze</a:t>
+            </a:r>
+          </a:p>
+        </p:txBody>
+      </p:sp>
+      <p:sp>
+        <p:nvSpPr>
+          <p:cNvPr id="6" name="Inhaltsplatzhalter 5"/>
+          <p:cNvSpPr>
+            <a:spLocks noGrp="1"/>
+          </p:cNvSpPr>
+          <p:nvPr>
+            <p:ph idx="1"/>
           </p:nvPr>
         </p:nvSpPr>
         <p:spPr/>
@@ -8725,53 +9447,25 @@
           </a:bodyPr>
           <a:lstStyle/>
           <a:p>
-            <a:r>
-              <a:rPr lang="de-DE" dirty="0" smtClean="0"/>
-              <a:t>Entscheidungsorientierte Ansätze </a:t>
-            </a:r>
+            <a:pPr marL="342900" lvl="1" indent="-342900"/>
             <a:r>
               <a:rPr lang="de-DE" dirty="0"/>
-              <a:t>-  Entscheidungslogisch-orientierte </a:t>
-            </a:r>
-            <a:r>
-              <a:rPr lang="de-DE" dirty="0" smtClean="0"/>
-              <a:t>Ansätze</a:t>
-            </a:r>
-            <a:endParaRPr lang="de-DE" dirty="0"/>
-          </a:p>
-        </p:txBody>
-      </p:sp>
-      <p:sp>
-        <p:nvSpPr>
-          <p:cNvPr id="3" name="Inhaltsplatzhalter 2"/>
-          <p:cNvSpPr>
-            <a:spLocks noGrp="1"/>
-          </p:cNvSpPr>
-          <p:nvPr>
-            <p:ph idx="1"/>
-          </p:nvPr>
-        </p:nvSpPr>
-        <p:spPr/>
-        <p:txBody>
-          <a:bodyPr/>
-          <a:lstStyle/>
-          <a:p>
-            <a:pPr marL="342900" lvl="2" indent="-342900"/>
-            <a:r>
-              <a:rPr lang="de-DE" dirty="0" smtClean="0"/>
-              <a:t>Organisatorische </a:t>
-            </a:r>
+              <a:t>Entscheidungslogisch-orientierte Ansätze</a:t>
+            </a:r>
+          </a:p>
+          <a:p>
+            <a:pPr marL="342900" lvl="1" indent="-342900"/>
             <a:r>
               <a:rPr lang="de-DE" dirty="0"/>
-              <a:t>Gestaltungsprobleme mit Hilfe von mathematischen Algorithmen für Entscheidungsmodelle </a:t>
-            </a:r>
-            <a:r>
-              <a:rPr lang="de-DE" dirty="0" smtClean="0"/>
-              <a:t>beschreiben</a:t>
-            </a:r>
-            <a:endParaRPr lang="de-DE" sz="2400" dirty="0"/>
-          </a:p>
-          <a:p>
+              <a:t>Entscheidungsprozess-orientierte Ansätze</a:t>
+            </a:r>
+          </a:p>
+          <a:p>
+            <a:pPr marL="342900" lvl="1" indent="-342900"/>
+            <a:r>
+              <a:rPr lang="de-DE" dirty="0" smtClean="0"/>
+              <a:t>Berücksichtigung der Motivation</a:t>
+            </a:r>
             <a:endParaRPr lang="de-DE" dirty="0"/>
           </a:p>
         </p:txBody>
@@ -8802,13 +9496,20 @@
     </p:spTree>
     <p:extLst>
       <p:ext uri="{BB962C8B-B14F-4D97-AF65-F5344CB8AC3E}">
-        <p14:creationId xmlns:p14="http://schemas.microsoft.com/office/powerpoint/2010/main" val="52258294"/>
+        <p14:creationId xmlns:p14="http://schemas.microsoft.com/office/powerpoint/2010/main" val="473945606"/>
       </p:ext>
     </p:extLst>
   </p:cSld>
   <p:clrMapOvr>
     <a:masterClrMapping/>
   </p:clrMapOvr>
+  <p:timing>
+    <p:tnLst>
+      <p:par>
+        <p:cTn id="1" dur="indefinite" restart="never" nodeType="tmRoot"/>
+      </p:par>
+    </p:tnLst>
+  </p:timing>
 </p:sld>
 </file>
 
@@ -8841,79 +9542,58 @@
         </p:nvSpPr>
         <p:spPr/>
         <p:txBody>
-          <a:bodyPr/>
-          <a:lstStyle/>
-          <a:p>
+          <a:bodyPr>
+            <a:normAutofit/>
+          </a:bodyPr>
+          <a:lstStyle/>
+          <a:p>
+            <a:r>
+              <a:rPr lang="de-DE" dirty="0" smtClean="0"/>
+              <a:t>Entscheidungsorientierte Ansätze </a:t>
+            </a:r>
             <a:r>
               <a:rPr lang="de-DE" dirty="0"/>
-              <a:t>Entscheidungsorientierte Ansätze </a:t>
-            </a:r>
-            <a:r>
-              <a:rPr lang="de-DE" dirty="0" smtClean="0"/>
-              <a:t>- </a:t>
+              <a:t>-  Entscheidungslogisch-orientierte </a:t>
+            </a:r>
+            <a:r>
+              <a:rPr lang="de-DE" dirty="0" smtClean="0"/>
+              <a:t>Ansätze</a:t>
+            </a:r>
+            <a:endParaRPr lang="de-DE" dirty="0"/>
+          </a:p>
+        </p:txBody>
+      </p:sp>
+      <p:sp>
+        <p:nvSpPr>
+          <p:cNvPr id="3" name="Inhaltsplatzhalter 2"/>
+          <p:cNvSpPr>
+            <a:spLocks noGrp="1"/>
+          </p:cNvSpPr>
+          <p:nvPr>
+            <p:ph idx="1"/>
+          </p:nvPr>
+        </p:nvSpPr>
+        <p:spPr/>
+        <p:txBody>
+          <a:bodyPr/>
+          <a:lstStyle/>
+          <a:p>
+            <a:pPr marL="342900" lvl="2" indent="-342900"/>
+            <a:r>
+              <a:rPr lang="de-DE" dirty="0" smtClean="0"/>
+              <a:t>Organisatorische </a:t>
             </a:r>
             <a:r>
               <a:rPr lang="de-DE" dirty="0"/>
-              <a:t>Entscheidungsprozess-orientierte Ansätze</a:t>
-            </a:r>
-            <a:endParaRPr lang="de-DE" dirty="0"/>
-          </a:p>
-        </p:txBody>
-      </p:sp>
-      <p:sp>
-        <p:nvSpPr>
-          <p:cNvPr id="3" name="Inhaltsplatzhalter 2"/>
-          <p:cNvSpPr>
-            <a:spLocks noGrp="1"/>
-          </p:cNvSpPr>
-          <p:nvPr>
-            <p:ph idx="1"/>
-          </p:nvPr>
-        </p:nvSpPr>
-        <p:spPr/>
-        <p:txBody>
-          <a:bodyPr/>
-          <a:lstStyle/>
-          <a:p>
-            <a:r>
-              <a:rPr lang="de-DE" dirty="0" smtClean="0"/>
-              <a:t>Organisationen sind Systeme, in denen Entscheidungen zur Zielerreichung getroffen werden</a:t>
-            </a:r>
-          </a:p>
-          <a:p>
-            <a:pPr marL="342900" lvl="2" indent="-342900"/>
-            <a:r>
-              <a:rPr lang="de-DE" dirty="0"/>
-              <a:t>Einfluss der Organisationsstruktur auf das Entscheidungs-Verhalten</a:t>
+              <a:t>Gestaltungsprobleme mit Hilfe von mathematischen Algorithmen für Entscheidungsmodelle </a:t>
+            </a:r>
+            <a:r>
+              <a:rPr lang="de-DE" dirty="0" smtClean="0"/>
+              <a:t>beschreiben</a:t>
             </a:r>
             <a:endParaRPr lang="de-DE" sz="2400" dirty="0"/>
           </a:p>
           <a:p>
-            <a:r>
-              <a:rPr lang="de-DE" dirty="0"/>
-              <a:t>Entscheidungen </a:t>
-            </a:r>
-            <a:r>
-              <a:rPr lang="de-DE" dirty="0" smtClean="0"/>
-              <a:t>müssen </a:t>
-            </a:r>
-            <a:r>
-              <a:rPr lang="de-DE" dirty="0"/>
-              <a:t>koordiniert werden </a:t>
-            </a:r>
-            <a:endParaRPr lang="de-DE" dirty="0" smtClean="0"/>
-          </a:p>
-          <a:p>
-            <a:r>
-              <a:rPr lang="de-DE" dirty="0" smtClean="0"/>
-              <a:t>Im Mittelpunkt steht das Entscheidungsverhalten</a:t>
-            </a:r>
-          </a:p>
-          <a:p>
-            <a:r>
-              <a:rPr lang="de-DE" dirty="0" smtClean="0"/>
-              <a:t>Organisationen sind das Entscheidungsumfeld</a:t>
-            </a:r>
             <a:endParaRPr lang="de-DE" dirty="0"/>
           </a:p>
         </p:txBody>
@@ -8944,13 +9624,20 @@
     </p:spTree>
     <p:extLst>
       <p:ext uri="{BB962C8B-B14F-4D97-AF65-F5344CB8AC3E}">
-        <p14:creationId xmlns:p14="http://schemas.microsoft.com/office/powerpoint/2010/main" val="1552110135"/>
+        <p14:creationId xmlns:p14="http://schemas.microsoft.com/office/powerpoint/2010/main" val="52258294"/>
       </p:ext>
     </p:extLst>
   </p:cSld>
   <p:clrMapOvr>
     <a:masterClrMapping/>
   </p:clrMapOvr>
+  <p:timing>
+    <p:tnLst>
+      <p:par>
+        <p:cTn id="1" dur="indefinite" restart="never" nodeType="tmRoot"/>
+      </p:par>
+    </p:tnLst>
+  </p:timing>
 </p:sld>
 </file>
 
@@ -8992,6 +9679,154 @@
             </a:r>
             <a:r>
               <a:rPr lang="de-DE" dirty="0" smtClean="0"/>
+              <a:t>- </a:t>
+            </a:r>
+            <a:r>
+              <a:rPr lang="de-DE" dirty="0"/>
+              <a:t>Entscheidungsprozess-orientierte Ansätze</a:t>
+            </a:r>
+          </a:p>
+        </p:txBody>
+      </p:sp>
+      <p:sp>
+        <p:nvSpPr>
+          <p:cNvPr id="3" name="Inhaltsplatzhalter 2"/>
+          <p:cNvSpPr>
+            <a:spLocks noGrp="1"/>
+          </p:cNvSpPr>
+          <p:nvPr>
+            <p:ph idx="1"/>
+          </p:nvPr>
+        </p:nvSpPr>
+        <p:spPr/>
+        <p:txBody>
+          <a:bodyPr/>
+          <a:lstStyle/>
+          <a:p>
+            <a:r>
+              <a:rPr lang="de-DE" dirty="0" smtClean="0"/>
+              <a:t>Organisationen sind Systeme, in denen Entscheidungen zur Zielerreichung getroffen werden</a:t>
+            </a:r>
+          </a:p>
+          <a:p>
+            <a:pPr marL="342900" lvl="2" indent="-342900"/>
+            <a:r>
+              <a:rPr lang="de-DE" dirty="0"/>
+              <a:t>Einfluss der Organisationsstruktur auf das Entscheidungs-Verhalten</a:t>
+            </a:r>
+            <a:endParaRPr lang="de-DE" sz="2400" dirty="0"/>
+          </a:p>
+          <a:p>
+            <a:r>
+              <a:rPr lang="de-DE" dirty="0"/>
+              <a:t>Entscheidungen </a:t>
+            </a:r>
+            <a:r>
+              <a:rPr lang="de-DE" dirty="0" smtClean="0"/>
+              <a:t>müssen </a:t>
+            </a:r>
+            <a:r>
+              <a:rPr lang="de-DE" dirty="0"/>
+              <a:t>koordiniert werden </a:t>
+            </a:r>
+            <a:endParaRPr lang="de-DE" dirty="0" smtClean="0"/>
+          </a:p>
+          <a:p>
+            <a:r>
+              <a:rPr lang="de-DE" dirty="0" smtClean="0"/>
+              <a:t>Im Mittelpunkt steht das Entscheidungsverhalten</a:t>
+            </a:r>
+          </a:p>
+          <a:p>
+            <a:r>
+              <a:rPr lang="de-DE" dirty="0" smtClean="0"/>
+              <a:t>Organisationen sind das Entscheidungsumfeld</a:t>
+            </a:r>
+            <a:endParaRPr lang="de-DE" dirty="0"/>
+          </a:p>
+        </p:txBody>
+      </p:sp>
+      <p:sp>
+        <p:nvSpPr>
+          <p:cNvPr id="4" name="Fußzeilenplatzhalter 3"/>
+          <p:cNvSpPr>
+            <a:spLocks noGrp="1"/>
+          </p:cNvSpPr>
+          <p:nvPr>
+            <p:ph type="ftr" sz="quarter" idx="11"/>
+          </p:nvPr>
+        </p:nvSpPr>
+        <p:spPr/>
+        <p:txBody>
+          <a:bodyPr/>
+          <a:lstStyle/>
+          <a:p>
+            <a:r>
+              <a:rPr lang="en-US" smtClean="0"/>
+              <a:t>| Dominik Meixner | Dominique Cheray |</a:t>
+            </a:r>
+            <a:endParaRPr lang="en-US" dirty="0"/>
+          </a:p>
+        </p:txBody>
+      </p:sp>
+    </p:spTree>
+    <p:extLst>
+      <p:ext uri="{BB962C8B-B14F-4D97-AF65-F5344CB8AC3E}">
+        <p14:creationId xmlns:p14="http://schemas.microsoft.com/office/powerpoint/2010/main" val="1552110135"/>
+      </p:ext>
+    </p:extLst>
+  </p:cSld>
+  <p:clrMapOvr>
+    <a:masterClrMapping/>
+  </p:clrMapOvr>
+  <p:timing>
+    <p:tnLst>
+      <p:par>
+        <p:cTn id="1" dur="indefinite" restart="never" nodeType="tmRoot"/>
+      </p:par>
+    </p:tnLst>
+  </p:timing>
+</p:sld>
+</file>
+
+<file path=ppt/slides/slide29.xml><?xml version="1.0" encoding="utf-8"?>
+<p:sld xmlns:a="http://schemas.openxmlformats.org/drawingml/2006/main" xmlns:r="http://schemas.openxmlformats.org/officeDocument/2006/relationships" xmlns:p="http://schemas.openxmlformats.org/presentationml/2006/main">
+  <p:cSld>
+    <p:spTree>
+      <p:nvGrpSpPr>
+        <p:cNvPr id="1" name=""/>
+        <p:cNvGrpSpPr/>
+        <p:nvPr/>
+      </p:nvGrpSpPr>
+      <p:grpSpPr>
+        <a:xfrm>
+          <a:off x="0" y="0"/>
+          <a:ext cx="0" cy="0"/>
+          <a:chOff x="0" y="0"/>
+          <a:chExt cx="0" cy="0"/>
+        </a:xfrm>
+      </p:grpSpPr>
+      <p:sp>
+        <p:nvSpPr>
+          <p:cNvPr id="2" name="Titel 1"/>
+          <p:cNvSpPr>
+            <a:spLocks noGrp="1"/>
+          </p:cNvSpPr>
+          <p:nvPr>
+            <p:ph type="title"/>
+          </p:nvPr>
+        </p:nvSpPr>
+        <p:spPr/>
+        <p:txBody>
+          <a:bodyPr/>
+          <a:lstStyle/>
+          <a:p>
+            <a:r>
+              <a:rPr lang="de-DE" dirty="0"/>
+              <a:t>Entscheidungsorientierte Ansätze </a:t>
+            </a:r>
+            <a:r>
+              <a:rPr lang="de-DE" dirty="0" smtClean="0"/>
               <a:t>– Berücksichtigung der Motivation</a:t>
             </a:r>
             <a:endParaRPr lang="de-DE" dirty="0"/>
@@ -9023,11 +9858,7 @@
             <a:pPr lvl="0"/>
             <a:r>
               <a:rPr lang="de-DE"/>
-              <a:t>Menschliches Entscheidungsverhalten im Blickpunkt </a:t>
-            </a:r>
-            <a:r>
-              <a:rPr lang="de-DE"/>
-              <a:t>der </a:t>
+              <a:t>Menschliches Entscheidungsverhalten im Blickpunkt der </a:t>
             </a:r>
             <a:r>
               <a:rPr lang="de-DE" smtClean="0"/>
@@ -9070,10 +9901,1906 @@
   <p:clrMapOvr>
     <a:masterClrMapping/>
   </p:clrMapOvr>
+  <p:timing>
+    <p:tnLst>
+      <p:par>
+        <p:cTn id="1" dur="indefinite" restart="never" nodeType="tmRoot"/>
+      </p:par>
+    </p:tnLst>
+  </p:timing>
 </p:sld>
 </file>
 
-<file path=ppt/slides/slide29.xml><?xml version="1.0" encoding="utf-8"?>
+<file path=ppt/slides/slide3.xml><?xml version="1.0" encoding="utf-8"?>
+<p:sld xmlns:a="http://schemas.openxmlformats.org/drawingml/2006/main" xmlns:r="http://schemas.openxmlformats.org/officeDocument/2006/relationships" xmlns:p="http://schemas.openxmlformats.org/presentationml/2006/main">
+  <p:cSld>
+    <p:spTree>
+      <p:nvGrpSpPr>
+        <p:cNvPr id="1" name=""/>
+        <p:cNvGrpSpPr/>
+        <p:nvPr/>
+      </p:nvGrpSpPr>
+      <p:grpSpPr>
+        <a:xfrm>
+          <a:off x="0" y="0"/>
+          <a:ext cx="0" cy="0"/>
+          <a:chOff x="0" y="0"/>
+          <a:chExt cx="0" cy="0"/>
+        </a:xfrm>
+      </p:grpSpPr>
+      <p:sp>
+        <p:nvSpPr>
+          <p:cNvPr id="2" name="Titel 1"/>
+          <p:cNvSpPr>
+            <a:spLocks noGrp="1"/>
+          </p:cNvSpPr>
+          <p:nvPr>
+            <p:ph type="title"/>
+          </p:nvPr>
+        </p:nvSpPr>
+        <p:spPr/>
+        <p:txBody>
+          <a:bodyPr/>
+          <a:lstStyle/>
+          <a:p>
+            <a:r>
+              <a:rPr lang="de-DE" dirty="0" smtClean="0"/>
+              <a:t>Definition Organisationstheorie</a:t>
+            </a:r>
+            <a:endParaRPr lang="de-DE" dirty="0"/>
+          </a:p>
+        </p:txBody>
+      </p:sp>
+      <p:sp>
+        <p:nvSpPr>
+          <p:cNvPr id="6" name="Textplatzhalter 5"/>
+          <p:cNvSpPr>
+            <a:spLocks noGrp="1"/>
+          </p:cNvSpPr>
+          <p:nvPr>
+            <p:ph type="body" idx="1"/>
+          </p:nvPr>
+        </p:nvSpPr>
+        <p:spPr/>
+        <p:txBody>
+          <a:bodyPr/>
+          <a:lstStyle/>
+          <a:p>
+            <a:endParaRPr lang="de-DE"/>
+          </a:p>
+        </p:txBody>
+      </p:sp>
+      <p:sp>
+        <p:nvSpPr>
+          <p:cNvPr id="4" name="Fußzeilenplatzhalter 3"/>
+          <p:cNvSpPr>
+            <a:spLocks noGrp="1"/>
+          </p:cNvSpPr>
+          <p:nvPr>
+            <p:ph type="ftr" sz="quarter" idx="11"/>
+          </p:nvPr>
+        </p:nvSpPr>
+        <p:spPr/>
+        <p:txBody>
+          <a:bodyPr/>
+          <a:lstStyle/>
+          <a:p>
+            <a:r>
+              <a:rPr lang="en-US" smtClean="0"/>
+              <a:t>| Dominik Meixner | Dominique Cheray |</a:t>
+            </a:r>
+            <a:endParaRPr lang="en-US" dirty="0"/>
+          </a:p>
+        </p:txBody>
+      </p:sp>
+    </p:spTree>
+    <p:extLst>
+      <p:ext uri="{BB962C8B-B14F-4D97-AF65-F5344CB8AC3E}">
+        <p14:creationId xmlns:p14="http://schemas.microsoft.com/office/powerpoint/2010/main" val="2849313809"/>
+      </p:ext>
+    </p:extLst>
+  </p:cSld>
+  <p:clrMapOvr>
+    <a:masterClrMapping/>
+  </p:clrMapOvr>
+  <p:timing>
+    <p:tnLst>
+      <p:par>
+        <p:cTn id="1" dur="indefinite" restart="never" nodeType="tmRoot"/>
+      </p:par>
+    </p:tnLst>
+  </p:timing>
+</p:sld>
+</file>
+
+<file path=ppt/slides/slide30.xml><?xml version="1.0" encoding="utf-8"?>
+<p:sld xmlns:a="http://schemas.openxmlformats.org/drawingml/2006/main" xmlns:r="http://schemas.openxmlformats.org/officeDocument/2006/relationships" xmlns:p="http://schemas.openxmlformats.org/presentationml/2006/main">
+  <p:cSld>
+    <p:spTree>
+      <p:nvGrpSpPr>
+        <p:cNvPr id="1" name=""/>
+        <p:cNvGrpSpPr/>
+        <p:nvPr/>
+      </p:nvGrpSpPr>
+      <p:grpSpPr>
+        <a:xfrm>
+          <a:off x="0" y="0"/>
+          <a:ext cx="0" cy="0"/>
+          <a:chOff x="0" y="0"/>
+          <a:chExt cx="0" cy="0"/>
+        </a:xfrm>
+      </p:grpSpPr>
+      <p:sp>
+        <p:nvSpPr>
+          <p:cNvPr id="2" name="Titel 1"/>
+          <p:cNvSpPr>
+            <a:spLocks noGrp="1"/>
+          </p:cNvSpPr>
+          <p:nvPr>
+            <p:ph type="title"/>
+          </p:nvPr>
+        </p:nvSpPr>
+        <p:spPr/>
+        <p:txBody>
+          <a:bodyPr/>
+          <a:lstStyle/>
+          <a:p>
+            <a:pPr lvl="0"/>
+            <a:r>
+              <a:rPr lang="de-DE" dirty="0"/>
+              <a:t>Situative </a:t>
+            </a:r>
+            <a:r>
+              <a:rPr lang="de-DE" dirty="0" smtClean="0"/>
+              <a:t>Ansätze</a:t>
+            </a:r>
+            <a:endParaRPr lang="de-DE" dirty="0"/>
+          </a:p>
+        </p:txBody>
+      </p:sp>
+      <p:sp>
+        <p:nvSpPr>
+          <p:cNvPr id="3" name="Textplatzhalter 2"/>
+          <p:cNvSpPr>
+            <a:spLocks noGrp="1"/>
+          </p:cNvSpPr>
+          <p:nvPr>
+            <p:ph type="body" idx="1"/>
+          </p:nvPr>
+        </p:nvSpPr>
+        <p:spPr/>
+        <p:txBody>
+          <a:bodyPr/>
+          <a:lstStyle/>
+          <a:p>
+            <a:endParaRPr lang="de-DE"/>
+          </a:p>
+        </p:txBody>
+      </p:sp>
+      <p:sp>
+        <p:nvSpPr>
+          <p:cNvPr id="4" name="Fußzeilenplatzhalter 3"/>
+          <p:cNvSpPr>
+            <a:spLocks noGrp="1"/>
+          </p:cNvSpPr>
+          <p:nvPr>
+            <p:ph type="ftr" sz="quarter" idx="11"/>
+          </p:nvPr>
+        </p:nvSpPr>
+        <p:spPr/>
+        <p:txBody>
+          <a:bodyPr/>
+          <a:lstStyle/>
+          <a:p>
+            <a:r>
+              <a:rPr lang="en-US" smtClean="0"/>
+              <a:t>| Dominik Meixner | Dominique Cheray |</a:t>
+            </a:r>
+            <a:endParaRPr lang="en-US" dirty="0"/>
+          </a:p>
+        </p:txBody>
+      </p:sp>
+    </p:spTree>
+    <p:extLst>
+      <p:ext uri="{BB962C8B-B14F-4D97-AF65-F5344CB8AC3E}">
+        <p14:creationId xmlns:p14="http://schemas.microsoft.com/office/powerpoint/2010/main" val="453615869"/>
+      </p:ext>
+    </p:extLst>
+  </p:cSld>
+  <p:clrMapOvr>
+    <a:masterClrMapping/>
+  </p:clrMapOvr>
+  <p:timing>
+    <p:tnLst>
+      <p:par>
+        <p:cTn id="1" dur="indefinite" restart="never" nodeType="tmRoot"/>
+      </p:par>
+    </p:tnLst>
+  </p:timing>
+</p:sld>
+</file>
+
+<file path=ppt/slides/slide31.xml><?xml version="1.0" encoding="utf-8"?>
+<p:sld xmlns:a="http://schemas.openxmlformats.org/drawingml/2006/main" xmlns:r="http://schemas.openxmlformats.org/officeDocument/2006/relationships" xmlns:p="http://schemas.openxmlformats.org/presentationml/2006/main">
+  <p:cSld>
+    <p:spTree>
+      <p:nvGrpSpPr>
+        <p:cNvPr id="1" name=""/>
+        <p:cNvGrpSpPr/>
+        <p:nvPr/>
+      </p:nvGrpSpPr>
+      <p:grpSpPr>
+        <a:xfrm>
+          <a:off x="0" y="0"/>
+          <a:ext cx="0" cy="0"/>
+          <a:chOff x="0" y="0"/>
+          <a:chExt cx="0" cy="0"/>
+        </a:xfrm>
+      </p:grpSpPr>
+      <p:sp>
+        <p:nvSpPr>
+          <p:cNvPr id="2" name="Titel 1"/>
+          <p:cNvSpPr>
+            <a:spLocks noGrp="1"/>
+          </p:cNvSpPr>
+          <p:nvPr>
+            <p:ph type="title"/>
+          </p:nvPr>
+        </p:nvSpPr>
+        <p:spPr/>
+        <p:txBody>
+          <a:bodyPr/>
+          <a:lstStyle/>
+          <a:p>
+            <a:r>
+              <a:rPr lang="de-DE" dirty="0" smtClean="0"/>
+              <a:t>Situative Ansätze</a:t>
+            </a:r>
+            <a:endParaRPr lang="de-DE" dirty="0"/>
+          </a:p>
+        </p:txBody>
+      </p:sp>
+      <p:sp>
+        <p:nvSpPr>
+          <p:cNvPr id="3" name="Inhaltsplatzhalter 2"/>
+          <p:cNvSpPr>
+            <a:spLocks noGrp="1"/>
+          </p:cNvSpPr>
+          <p:nvPr>
+            <p:ph idx="1"/>
+          </p:nvPr>
+        </p:nvSpPr>
+        <p:spPr/>
+        <p:txBody>
+          <a:bodyPr/>
+          <a:lstStyle/>
+          <a:p>
+            <a:r>
+              <a:rPr lang="de-DE" dirty="0" smtClean="0"/>
+              <a:t>Analytische Varianten</a:t>
+            </a:r>
+          </a:p>
+          <a:p>
+            <a:r>
+              <a:rPr lang="de-DE" dirty="0" smtClean="0"/>
+              <a:t>Pragmatische Varianten</a:t>
+            </a:r>
+          </a:p>
+          <a:p>
+            <a:r>
+              <a:rPr lang="de-DE" dirty="0" smtClean="0"/>
+              <a:t>Berücksichtigung der Motivation</a:t>
+            </a:r>
+            <a:endParaRPr lang="de-DE" dirty="0"/>
+          </a:p>
+        </p:txBody>
+      </p:sp>
+      <p:sp>
+        <p:nvSpPr>
+          <p:cNvPr id="4" name="Fußzeilenplatzhalter 3"/>
+          <p:cNvSpPr>
+            <a:spLocks noGrp="1"/>
+          </p:cNvSpPr>
+          <p:nvPr>
+            <p:ph type="ftr" sz="quarter" idx="11"/>
+          </p:nvPr>
+        </p:nvSpPr>
+        <p:spPr/>
+        <p:txBody>
+          <a:bodyPr/>
+          <a:lstStyle/>
+          <a:p>
+            <a:r>
+              <a:rPr lang="en-US" smtClean="0"/>
+              <a:t>| Dominik Meixner | Dominique Cheray |</a:t>
+            </a:r>
+            <a:endParaRPr lang="en-US" dirty="0"/>
+          </a:p>
+        </p:txBody>
+      </p:sp>
+    </p:spTree>
+    <p:extLst>
+      <p:ext uri="{BB962C8B-B14F-4D97-AF65-F5344CB8AC3E}">
+        <p14:creationId xmlns:p14="http://schemas.microsoft.com/office/powerpoint/2010/main" val="2770134690"/>
+      </p:ext>
+    </p:extLst>
+  </p:cSld>
+  <p:clrMapOvr>
+    <a:masterClrMapping/>
+  </p:clrMapOvr>
+  <p:timing>
+    <p:tnLst>
+      <p:par>
+        <p:cTn id="1" dur="indefinite" restart="never" nodeType="tmRoot"/>
+      </p:par>
+    </p:tnLst>
+  </p:timing>
+</p:sld>
+</file>
+
+<file path=ppt/slides/slide32.xml><?xml version="1.0" encoding="utf-8"?>
+<p:sld xmlns:a="http://schemas.openxmlformats.org/drawingml/2006/main" xmlns:r="http://schemas.openxmlformats.org/officeDocument/2006/relationships" xmlns:p="http://schemas.openxmlformats.org/presentationml/2006/main">
+  <p:cSld>
+    <p:spTree>
+      <p:nvGrpSpPr>
+        <p:cNvPr id="1" name=""/>
+        <p:cNvGrpSpPr/>
+        <p:nvPr/>
+      </p:nvGrpSpPr>
+      <p:grpSpPr>
+        <a:xfrm>
+          <a:off x="0" y="0"/>
+          <a:ext cx="0" cy="0"/>
+          <a:chOff x="0" y="0"/>
+          <a:chExt cx="0" cy="0"/>
+        </a:xfrm>
+      </p:grpSpPr>
+      <p:sp>
+        <p:nvSpPr>
+          <p:cNvPr id="2" name="Titel 1"/>
+          <p:cNvSpPr>
+            <a:spLocks noGrp="1"/>
+          </p:cNvSpPr>
+          <p:nvPr>
+            <p:ph type="title"/>
+          </p:nvPr>
+        </p:nvSpPr>
+        <p:spPr/>
+        <p:txBody>
+          <a:bodyPr/>
+          <a:lstStyle/>
+          <a:p>
+            <a:r>
+              <a:rPr lang="de-DE" dirty="0" smtClean="0"/>
+              <a:t>Situative Ansätze – Analytische Varianten</a:t>
+            </a:r>
+            <a:endParaRPr lang="de-DE" dirty="0"/>
+          </a:p>
+        </p:txBody>
+      </p:sp>
+      <p:sp>
+        <p:nvSpPr>
+          <p:cNvPr id="3" name="Inhaltsplatzhalter 2"/>
+          <p:cNvSpPr>
+            <a:spLocks noGrp="1"/>
+          </p:cNvSpPr>
+          <p:nvPr>
+            <p:ph idx="1"/>
+          </p:nvPr>
+        </p:nvSpPr>
+        <p:spPr/>
+        <p:txBody>
+          <a:bodyPr/>
+          <a:lstStyle/>
+          <a:p>
+            <a:r>
+              <a:rPr lang="de-DE" dirty="0" smtClean="0"/>
+              <a:t>Fragestellungen:</a:t>
+            </a:r>
+          </a:p>
+          <a:p>
+            <a:pPr lvl="1"/>
+            <a:r>
+              <a:rPr lang="de-DE" dirty="0"/>
+              <a:t>Warum unterscheiden sich die Organisationen verschiedener </a:t>
+            </a:r>
+            <a:r>
+              <a:rPr lang="de-DE" dirty="0" smtClean="0"/>
+              <a:t>Unternehmen</a:t>
+            </a:r>
+          </a:p>
+          <a:p>
+            <a:pPr lvl="1"/>
+            <a:r>
+              <a:rPr lang="de-DE" dirty="0"/>
+              <a:t>Warum verhalten sich die Mitglieder der </a:t>
+            </a:r>
+            <a:r>
+              <a:rPr lang="de-DE" dirty="0" smtClean="0"/>
+              <a:t>Organisationen unterschiedlich</a:t>
+            </a:r>
+          </a:p>
+          <a:p>
+            <a:pPr lvl="1"/>
+            <a:r>
+              <a:rPr lang="de-DE" dirty="0"/>
+              <a:t>Warum sind Organisationen mehr oder weniger </a:t>
+            </a:r>
+            <a:r>
+              <a:rPr lang="de-DE" dirty="0" smtClean="0"/>
+              <a:t>effizient</a:t>
+            </a:r>
+            <a:endParaRPr lang="de-DE" dirty="0"/>
+          </a:p>
+        </p:txBody>
+      </p:sp>
+      <p:sp>
+        <p:nvSpPr>
+          <p:cNvPr id="4" name="Fußzeilenplatzhalter 3"/>
+          <p:cNvSpPr>
+            <a:spLocks noGrp="1"/>
+          </p:cNvSpPr>
+          <p:nvPr>
+            <p:ph type="ftr" sz="quarter" idx="11"/>
+          </p:nvPr>
+        </p:nvSpPr>
+        <p:spPr/>
+        <p:txBody>
+          <a:bodyPr/>
+          <a:lstStyle/>
+          <a:p>
+            <a:r>
+              <a:rPr lang="en-US" smtClean="0"/>
+              <a:t>| Dominik Meixner | Dominique Cheray |</a:t>
+            </a:r>
+            <a:endParaRPr lang="en-US" dirty="0"/>
+          </a:p>
+        </p:txBody>
+      </p:sp>
+    </p:spTree>
+    <p:extLst>
+      <p:ext uri="{BB962C8B-B14F-4D97-AF65-F5344CB8AC3E}">
+        <p14:creationId xmlns:p14="http://schemas.microsoft.com/office/powerpoint/2010/main" val="715526617"/>
+      </p:ext>
+    </p:extLst>
+  </p:cSld>
+  <p:clrMapOvr>
+    <a:masterClrMapping/>
+  </p:clrMapOvr>
+  <p:timing>
+    <p:tnLst>
+      <p:par>
+        <p:cTn id="1" dur="indefinite" restart="never" nodeType="tmRoot"/>
+      </p:par>
+    </p:tnLst>
+  </p:timing>
+</p:sld>
+</file>
+
+<file path=ppt/slides/slide33.xml><?xml version="1.0" encoding="utf-8"?>
+<p:sld xmlns:a="http://schemas.openxmlformats.org/drawingml/2006/main" xmlns:r="http://schemas.openxmlformats.org/officeDocument/2006/relationships" xmlns:p="http://schemas.openxmlformats.org/presentationml/2006/main">
+  <p:cSld>
+    <p:spTree>
+      <p:nvGrpSpPr>
+        <p:cNvPr id="1" name=""/>
+        <p:cNvGrpSpPr/>
+        <p:nvPr/>
+      </p:nvGrpSpPr>
+      <p:grpSpPr>
+        <a:xfrm>
+          <a:off x="0" y="0"/>
+          <a:ext cx="0" cy="0"/>
+          <a:chOff x="0" y="0"/>
+          <a:chExt cx="0" cy="0"/>
+        </a:xfrm>
+      </p:grpSpPr>
+      <p:sp>
+        <p:nvSpPr>
+          <p:cNvPr id="2" name="Titel 1"/>
+          <p:cNvSpPr>
+            <a:spLocks noGrp="1"/>
+          </p:cNvSpPr>
+          <p:nvPr>
+            <p:ph type="title"/>
+          </p:nvPr>
+        </p:nvSpPr>
+        <p:spPr/>
+        <p:txBody>
+          <a:bodyPr/>
+          <a:lstStyle/>
+          <a:p>
+            <a:r>
+              <a:rPr lang="de-DE" dirty="0" smtClean="0"/>
+              <a:t>Situative Ansätze – Pragmatische Varianten</a:t>
+            </a:r>
+            <a:endParaRPr lang="de-DE" dirty="0"/>
+          </a:p>
+        </p:txBody>
+      </p:sp>
+      <p:sp>
+        <p:nvSpPr>
+          <p:cNvPr id="3" name="Inhaltsplatzhalter 2"/>
+          <p:cNvSpPr>
+            <a:spLocks noGrp="1"/>
+          </p:cNvSpPr>
+          <p:nvPr>
+            <p:ph idx="1"/>
+          </p:nvPr>
+        </p:nvSpPr>
+        <p:spPr/>
+        <p:txBody>
+          <a:bodyPr/>
+          <a:lstStyle/>
+          <a:p>
+            <a:r>
+              <a:rPr lang="de-DE" dirty="0" smtClean="0"/>
+              <a:t>Fragestellung: </a:t>
+            </a:r>
+          </a:p>
+          <a:p>
+            <a:pPr lvl="1"/>
+            <a:r>
+              <a:rPr lang="de-DE" dirty="0"/>
+              <a:t>Wie lässt sich die Organisation eines Unternehmens gestalten, damit sie den veränderten </a:t>
+            </a:r>
+            <a:r>
+              <a:rPr lang="de-DE" dirty="0" smtClean="0"/>
+              <a:t>Anforderungen </a:t>
+            </a:r>
+            <a:r>
+              <a:rPr lang="de-DE" dirty="0"/>
+              <a:t>gerecht wird?</a:t>
+            </a:r>
+            <a:endParaRPr lang="de-DE" dirty="0"/>
+          </a:p>
+        </p:txBody>
+      </p:sp>
+      <p:sp>
+        <p:nvSpPr>
+          <p:cNvPr id="4" name="Fußzeilenplatzhalter 3"/>
+          <p:cNvSpPr>
+            <a:spLocks noGrp="1"/>
+          </p:cNvSpPr>
+          <p:nvPr>
+            <p:ph type="ftr" sz="quarter" idx="11"/>
+          </p:nvPr>
+        </p:nvSpPr>
+        <p:spPr/>
+        <p:txBody>
+          <a:bodyPr/>
+          <a:lstStyle/>
+          <a:p>
+            <a:r>
+              <a:rPr lang="en-US" smtClean="0"/>
+              <a:t>| Dominik Meixner | Dominique Cheray |</a:t>
+            </a:r>
+            <a:endParaRPr lang="en-US" dirty="0"/>
+          </a:p>
+        </p:txBody>
+      </p:sp>
+    </p:spTree>
+    <p:extLst>
+      <p:ext uri="{BB962C8B-B14F-4D97-AF65-F5344CB8AC3E}">
+        <p14:creationId xmlns:p14="http://schemas.microsoft.com/office/powerpoint/2010/main" val="1209558666"/>
+      </p:ext>
+    </p:extLst>
+  </p:cSld>
+  <p:clrMapOvr>
+    <a:masterClrMapping/>
+  </p:clrMapOvr>
+  <p:timing>
+    <p:tnLst>
+      <p:par>
+        <p:cTn id="1" dur="indefinite" restart="never" nodeType="tmRoot"/>
+      </p:par>
+    </p:tnLst>
+  </p:timing>
+</p:sld>
+</file>
+
+<file path=ppt/slides/slide34.xml><?xml version="1.0" encoding="utf-8"?>
+<p:sld xmlns:a="http://schemas.openxmlformats.org/drawingml/2006/main" xmlns:r="http://schemas.openxmlformats.org/officeDocument/2006/relationships" xmlns:p="http://schemas.openxmlformats.org/presentationml/2006/main">
+  <p:cSld>
+    <p:spTree>
+      <p:nvGrpSpPr>
+        <p:cNvPr id="1" name=""/>
+        <p:cNvGrpSpPr/>
+        <p:nvPr/>
+      </p:nvGrpSpPr>
+      <p:grpSpPr>
+        <a:xfrm>
+          <a:off x="0" y="0"/>
+          <a:ext cx="0" cy="0"/>
+          <a:chOff x="0" y="0"/>
+          <a:chExt cx="0" cy="0"/>
+        </a:xfrm>
+      </p:grpSpPr>
+      <p:sp>
+        <p:nvSpPr>
+          <p:cNvPr id="2" name="Titel 1"/>
+          <p:cNvSpPr>
+            <a:spLocks noGrp="1"/>
+          </p:cNvSpPr>
+          <p:nvPr>
+            <p:ph type="title"/>
+          </p:nvPr>
+        </p:nvSpPr>
+        <p:spPr/>
+        <p:txBody>
+          <a:bodyPr/>
+          <a:lstStyle/>
+          <a:p>
+            <a:r>
+              <a:rPr lang="de-DE" dirty="0" smtClean="0"/>
+              <a:t>Situative Ansätze – Berücksichtigung der Motivation</a:t>
+            </a:r>
+            <a:endParaRPr lang="de-DE" dirty="0"/>
+          </a:p>
+        </p:txBody>
+      </p:sp>
+      <p:sp>
+        <p:nvSpPr>
+          <p:cNvPr id="3" name="Inhaltsplatzhalter 2"/>
+          <p:cNvSpPr>
+            <a:spLocks noGrp="1"/>
+          </p:cNvSpPr>
+          <p:nvPr>
+            <p:ph idx="1"/>
+          </p:nvPr>
+        </p:nvSpPr>
+        <p:spPr/>
+        <p:txBody>
+          <a:bodyPr/>
+          <a:lstStyle/>
+          <a:p>
+            <a:r>
+              <a:rPr lang="de-DE" dirty="0" smtClean="0"/>
+              <a:t>Modelle berücksichtigen nicht den Entscheidungsträger</a:t>
+            </a:r>
+          </a:p>
+          <a:p>
+            <a:r>
+              <a:rPr lang="de-DE" dirty="0" smtClean="0"/>
+              <a:t>Entscheidungsverhalten ist aber verantwortlich für Organisationsgestaltung</a:t>
+            </a:r>
+            <a:endParaRPr lang="de-DE" dirty="0"/>
+          </a:p>
+        </p:txBody>
+      </p:sp>
+      <p:sp>
+        <p:nvSpPr>
+          <p:cNvPr id="4" name="Fußzeilenplatzhalter 3"/>
+          <p:cNvSpPr>
+            <a:spLocks noGrp="1"/>
+          </p:cNvSpPr>
+          <p:nvPr>
+            <p:ph type="ftr" sz="quarter" idx="11"/>
+          </p:nvPr>
+        </p:nvSpPr>
+        <p:spPr/>
+        <p:txBody>
+          <a:bodyPr/>
+          <a:lstStyle/>
+          <a:p>
+            <a:r>
+              <a:rPr lang="en-US" smtClean="0"/>
+              <a:t>| Dominik Meixner | Dominique Cheray |</a:t>
+            </a:r>
+            <a:endParaRPr lang="en-US" dirty="0"/>
+          </a:p>
+        </p:txBody>
+      </p:sp>
+    </p:spTree>
+    <p:extLst>
+      <p:ext uri="{BB962C8B-B14F-4D97-AF65-F5344CB8AC3E}">
+        <p14:creationId xmlns:p14="http://schemas.microsoft.com/office/powerpoint/2010/main" val="3155840016"/>
+      </p:ext>
+    </p:extLst>
+  </p:cSld>
+  <p:clrMapOvr>
+    <a:masterClrMapping/>
+  </p:clrMapOvr>
+  <p:timing>
+    <p:tnLst>
+      <p:par>
+        <p:cTn id="1" dur="indefinite" restart="never" nodeType="tmRoot"/>
+      </p:par>
+    </p:tnLst>
+  </p:timing>
+</p:sld>
+</file>
+
+<file path=ppt/slides/slide35.xml><?xml version="1.0" encoding="utf-8"?>
+<p:sld xmlns:a="http://schemas.openxmlformats.org/drawingml/2006/main" xmlns:r="http://schemas.openxmlformats.org/officeDocument/2006/relationships" xmlns:p="http://schemas.openxmlformats.org/presentationml/2006/main">
+  <p:cSld>
+    <p:spTree>
+      <p:nvGrpSpPr>
+        <p:cNvPr id="1" name=""/>
+        <p:cNvGrpSpPr/>
+        <p:nvPr/>
+      </p:nvGrpSpPr>
+      <p:grpSpPr>
+        <a:xfrm>
+          <a:off x="0" y="0"/>
+          <a:ext cx="0" cy="0"/>
+          <a:chOff x="0" y="0"/>
+          <a:chExt cx="0" cy="0"/>
+        </a:xfrm>
+      </p:grpSpPr>
+      <p:sp>
+        <p:nvSpPr>
+          <p:cNvPr id="2" name="Titel 1"/>
+          <p:cNvSpPr>
+            <a:spLocks noGrp="1"/>
+          </p:cNvSpPr>
+          <p:nvPr>
+            <p:ph type="title"/>
+          </p:nvPr>
+        </p:nvSpPr>
+        <p:spPr/>
+        <p:txBody>
+          <a:bodyPr/>
+          <a:lstStyle/>
+          <a:p>
+            <a:r>
+              <a:rPr lang="de-DE" dirty="0" smtClean="0"/>
+              <a:t>Systemorientierte Ansätze</a:t>
+            </a:r>
+            <a:endParaRPr lang="de-DE" dirty="0"/>
+          </a:p>
+        </p:txBody>
+      </p:sp>
+      <p:sp>
+        <p:nvSpPr>
+          <p:cNvPr id="3" name="Textplatzhalter 2"/>
+          <p:cNvSpPr>
+            <a:spLocks noGrp="1"/>
+          </p:cNvSpPr>
+          <p:nvPr>
+            <p:ph type="body" idx="1"/>
+          </p:nvPr>
+        </p:nvSpPr>
+        <p:spPr/>
+        <p:txBody>
+          <a:bodyPr/>
+          <a:lstStyle/>
+          <a:p>
+            <a:endParaRPr lang="de-DE"/>
+          </a:p>
+        </p:txBody>
+      </p:sp>
+      <p:sp>
+        <p:nvSpPr>
+          <p:cNvPr id="4" name="Fußzeilenplatzhalter 3"/>
+          <p:cNvSpPr>
+            <a:spLocks noGrp="1"/>
+          </p:cNvSpPr>
+          <p:nvPr>
+            <p:ph type="ftr" sz="quarter" idx="11"/>
+          </p:nvPr>
+        </p:nvSpPr>
+        <p:spPr/>
+        <p:txBody>
+          <a:bodyPr/>
+          <a:lstStyle/>
+          <a:p>
+            <a:r>
+              <a:rPr lang="en-US" smtClean="0"/>
+              <a:t>| Dominik Meixner | Dominique Cheray |</a:t>
+            </a:r>
+            <a:endParaRPr lang="en-US" dirty="0"/>
+          </a:p>
+        </p:txBody>
+      </p:sp>
+    </p:spTree>
+    <p:extLst>
+      <p:ext uri="{BB962C8B-B14F-4D97-AF65-F5344CB8AC3E}">
+        <p14:creationId xmlns:p14="http://schemas.microsoft.com/office/powerpoint/2010/main" val="2950799656"/>
+      </p:ext>
+    </p:extLst>
+  </p:cSld>
+  <p:clrMapOvr>
+    <a:masterClrMapping/>
+  </p:clrMapOvr>
+  <p:timing>
+    <p:tnLst>
+      <p:par>
+        <p:cTn id="1" dur="indefinite" restart="never" nodeType="tmRoot"/>
+      </p:par>
+    </p:tnLst>
+  </p:timing>
+</p:sld>
+</file>
+
+<file path=ppt/slides/slide36.xml><?xml version="1.0" encoding="utf-8"?>
+<p:sld xmlns:a="http://schemas.openxmlformats.org/drawingml/2006/main" xmlns:r="http://schemas.openxmlformats.org/officeDocument/2006/relationships" xmlns:p="http://schemas.openxmlformats.org/presentationml/2006/main">
+  <p:cSld>
+    <p:spTree>
+      <p:nvGrpSpPr>
+        <p:cNvPr id="1" name=""/>
+        <p:cNvGrpSpPr/>
+        <p:nvPr/>
+      </p:nvGrpSpPr>
+      <p:grpSpPr>
+        <a:xfrm>
+          <a:off x="0" y="0"/>
+          <a:ext cx="0" cy="0"/>
+          <a:chOff x="0" y="0"/>
+          <a:chExt cx="0" cy="0"/>
+        </a:xfrm>
+      </p:grpSpPr>
+      <p:sp>
+        <p:nvSpPr>
+          <p:cNvPr id="2" name="Titel 1"/>
+          <p:cNvSpPr>
+            <a:spLocks noGrp="1"/>
+          </p:cNvSpPr>
+          <p:nvPr>
+            <p:ph type="title"/>
+          </p:nvPr>
+        </p:nvSpPr>
+        <p:spPr/>
+        <p:txBody>
+          <a:bodyPr/>
+          <a:lstStyle/>
+          <a:p>
+            <a:r>
+              <a:rPr lang="de-DE" dirty="0" smtClean="0"/>
+              <a:t>Systemorientierte Ansätze</a:t>
+            </a:r>
+            <a:endParaRPr lang="de-DE" dirty="0"/>
+          </a:p>
+        </p:txBody>
+      </p:sp>
+      <p:sp>
+        <p:nvSpPr>
+          <p:cNvPr id="3" name="Inhaltsplatzhalter 2"/>
+          <p:cNvSpPr>
+            <a:spLocks noGrp="1"/>
+          </p:cNvSpPr>
+          <p:nvPr>
+            <p:ph idx="1"/>
+          </p:nvPr>
+        </p:nvSpPr>
+        <p:spPr/>
+        <p:txBody>
+          <a:bodyPr/>
+          <a:lstStyle/>
+          <a:p>
+            <a:pPr marL="342900" lvl="1" indent="-342900"/>
+            <a:r>
+              <a:rPr lang="de-DE" dirty="0"/>
+              <a:t>Systemtheoretisch-kybernetischer Ansatz</a:t>
+            </a:r>
+            <a:endParaRPr lang="de-DE" sz="2400" dirty="0"/>
+          </a:p>
+          <a:p>
+            <a:pPr marL="342900" lvl="1" indent="-342900"/>
+            <a:r>
+              <a:rPr lang="de-DE" dirty="0"/>
+              <a:t>Soziologie</a:t>
+            </a:r>
+            <a:endParaRPr lang="de-DE" sz="2400" dirty="0"/>
+          </a:p>
+          <a:p>
+            <a:pPr marL="342900" lvl="1" indent="-342900"/>
+            <a:r>
+              <a:rPr lang="de-DE" dirty="0"/>
+              <a:t>Soziotechnischer Ansatz</a:t>
+            </a:r>
+            <a:endParaRPr lang="de-DE" sz="2400" dirty="0"/>
+          </a:p>
+          <a:p>
+            <a:pPr marL="342900" lvl="1" indent="-342900"/>
+            <a:r>
+              <a:rPr lang="de-DE" dirty="0"/>
+              <a:t>Soziosystemischer Ansatz</a:t>
+            </a:r>
+            <a:endParaRPr lang="de-DE" sz="2400" dirty="0"/>
+          </a:p>
+          <a:p>
+            <a:r>
+              <a:rPr lang="de-DE" dirty="0" smtClean="0"/>
+              <a:t>Berücksichtigung der Motivation</a:t>
+            </a:r>
+            <a:endParaRPr lang="de-DE" dirty="0"/>
+          </a:p>
+        </p:txBody>
+      </p:sp>
+      <p:sp>
+        <p:nvSpPr>
+          <p:cNvPr id="4" name="Fußzeilenplatzhalter 3"/>
+          <p:cNvSpPr>
+            <a:spLocks noGrp="1"/>
+          </p:cNvSpPr>
+          <p:nvPr>
+            <p:ph type="ftr" sz="quarter" idx="11"/>
+          </p:nvPr>
+        </p:nvSpPr>
+        <p:spPr/>
+        <p:txBody>
+          <a:bodyPr/>
+          <a:lstStyle/>
+          <a:p>
+            <a:r>
+              <a:rPr lang="en-US" smtClean="0"/>
+              <a:t>| Dominik Meixner | Dominique Cheray |</a:t>
+            </a:r>
+            <a:endParaRPr lang="en-US" dirty="0"/>
+          </a:p>
+        </p:txBody>
+      </p:sp>
+    </p:spTree>
+    <p:extLst>
+      <p:ext uri="{BB962C8B-B14F-4D97-AF65-F5344CB8AC3E}">
+        <p14:creationId xmlns:p14="http://schemas.microsoft.com/office/powerpoint/2010/main" val="1315227254"/>
+      </p:ext>
+    </p:extLst>
+  </p:cSld>
+  <p:clrMapOvr>
+    <a:masterClrMapping/>
+  </p:clrMapOvr>
+  <p:timing>
+    <p:tnLst>
+      <p:par>
+        <p:cTn id="1" dur="indefinite" restart="never" nodeType="tmRoot"/>
+      </p:par>
+    </p:tnLst>
+  </p:timing>
+</p:sld>
+</file>
+
+<file path=ppt/slides/slide37.xml><?xml version="1.0" encoding="utf-8"?>
+<p:sld xmlns:a="http://schemas.openxmlformats.org/drawingml/2006/main" xmlns:r="http://schemas.openxmlformats.org/officeDocument/2006/relationships" xmlns:p="http://schemas.openxmlformats.org/presentationml/2006/main">
+  <p:cSld>
+    <p:spTree>
+      <p:nvGrpSpPr>
+        <p:cNvPr id="1" name=""/>
+        <p:cNvGrpSpPr/>
+        <p:nvPr/>
+      </p:nvGrpSpPr>
+      <p:grpSpPr>
+        <a:xfrm>
+          <a:off x="0" y="0"/>
+          <a:ext cx="0" cy="0"/>
+          <a:chOff x="0" y="0"/>
+          <a:chExt cx="0" cy="0"/>
+        </a:xfrm>
+      </p:grpSpPr>
+      <p:sp>
+        <p:nvSpPr>
+          <p:cNvPr id="2" name="Titel 1"/>
+          <p:cNvSpPr>
+            <a:spLocks noGrp="1"/>
+          </p:cNvSpPr>
+          <p:nvPr>
+            <p:ph type="title"/>
+          </p:nvPr>
+        </p:nvSpPr>
+        <p:spPr/>
+        <p:txBody>
+          <a:bodyPr/>
+          <a:lstStyle/>
+          <a:p>
+            <a:r>
+              <a:rPr lang="de-DE" dirty="0"/>
+              <a:t>Systemorientierte </a:t>
+            </a:r>
+            <a:r>
+              <a:rPr lang="de-DE" dirty="0" smtClean="0"/>
+              <a:t>Ansätze - </a:t>
+            </a:r>
+            <a:r>
+              <a:rPr lang="de-DE" dirty="0"/>
+              <a:t>Systemtheoretisch-kybernetischer Ansatz</a:t>
+            </a:r>
+            <a:endParaRPr lang="de-DE" dirty="0"/>
+          </a:p>
+        </p:txBody>
+      </p:sp>
+      <p:sp>
+        <p:nvSpPr>
+          <p:cNvPr id="3" name="Inhaltsplatzhalter 2"/>
+          <p:cNvSpPr>
+            <a:spLocks noGrp="1"/>
+          </p:cNvSpPr>
+          <p:nvPr>
+            <p:ph idx="1"/>
+          </p:nvPr>
+        </p:nvSpPr>
+        <p:spPr/>
+        <p:txBody>
+          <a:bodyPr/>
+          <a:lstStyle/>
+          <a:p>
+            <a:r>
+              <a:rPr lang="de-DE" dirty="0" smtClean="0"/>
+              <a:t>Kernaussage:</a:t>
+            </a:r>
+          </a:p>
+          <a:p>
+            <a:pPr lvl="1"/>
+            <a:r>
+              <a:rPr lang="de-DE" dirty="0" smtClean="0"/>
+              <a:t>Soziale Systeme verfügen über die Fähigkeit zur Selbstorganisation</a:t>
+            </a:r>
+          </a:p>
+          <a:p>
+            <a:pPr lvl="1"/>
+            <a:r>
+              <a:rPr lang="de-DE" dirty="0" smtClean="0"/>
+              <a:t>Entwickeln hierbei Verhaltensregeln weiter</a:t>
+            </a:r>
+            <a:endParaRPr lang="de-DE" dirty="0"/>
+          </a:p>
+        </p:txBody>
+      </p:sp>
+      <p:sp>
+        <p:nvSpPr>
+          <p:cNvPr id="4" name="Fußzeilenplatzhalter 3"/>
+          <p:cNvSpPr>
+            <a:spLocks noGrp="1"/>
+          </p:cNvSpPr>
+          <p:nvPr>
+            <p:ph type="ftr" sz="quarter" idx="11"/>
+          </p:nvPr>
+        </p:nvSpPr>
+        <p:spPr/>
+        <p:txBody>
+          <a:bodyPr/>
+          <a:lstStyle/>
+          <a:p>
+            <a:r>
+              <a:rPr lang="en-US" smtClean="0"/>
+              <a:t>| Dominik Meixner | Dominique Cheray |</a:t>
+            </a:r>
+            <a:endParaRPr lang="en-US" dirty="0"/>
+          </a:p>
+        </p:txBody>
+      </p:sp>
+    </p:spTree>
+    <p:extLst>
+      <p:ext uri="{BB962C8B-B14F-4D97-AF65-F5344CB8AC3E}">
+        <p14:creationId xmlns:p14="http://schemas.microsoft.com/office/powerpoint/2010/main" val="650697209"/>
+      </p:ext>
+    </p:extLst>
+  </p:cSld>
+  <p:clrMapOvr>
+    <a:masterClrMapping/>
+  </p:clrMapOvr>
+  <p:timing>
+    <p:tnLst>
+      <p:par>
+        <p:cTn id="1" dur="indefinite" restart="never" nodeType="tmRoot"/>
+      </p:par>
+    </p:tnLst>
+  </p:timing>
+</p:sld>
+</file>
+
+<file path=ppt/slides/slide38.xml><?xml version="1.0" encoding="utf-8"?>
+<p:sld xmlns:a="http://schemas.openxmlformats.org/drawingml/2006/main" xmlns:r="http://schemas.openxmlformats.org/officeDocument/2006/relationships" xmlns:p="http://schemas.openxmlformats.org/presentationml/2006/main">
+  <p:cSld>
+    <p:spTree>
+      <p:nvGrpSpPr>
+        <p:cNvPr id="1" name=""/>
+        <p:cNvGrpSpPr/>
+        <p:nvPr/>
+      </p:nvGrpSpPr>
+      <p:grpSpPr>
+        <a:xfrm>
+          <a:off x="0" y="0"/>
+          <a:ext cx="0" cy="0"/>
+          <a:chOff x="0" y="0"/>
+          <a:chExt cx="0" cy="0"/>
+        </a:xfrm>
+      </p:grpSpPr>
+      <p:sp>
+        <p:nvSpPr>
+          <p:cNvPr id="2" name="Titel 1"/>
+          <p:cNvSpPr>
+            <a:spLocks noGrp="1"/>
+          </p:cNvSpPr>
+          <p:nvPr>
+            <p:ph type="title"/>
+          </p:nvPr>
+        </p:nvSpPr>
+        <p:spPr/>
+        <p:txBody>
+          <a:bodyPr/>
+          <a:lstStyle/>
+          <a:p>
+            <a:r>
+              <a:rPr lang="de-DE" dirty="0"/>
+              <a:t>Systemorientierte Ansätze </a:t>
+            </a:r>
+            <a:r>
+              <a:rPr lang="de-DE" dirty="0" smtClean="0"/>
+              <a:t>- Soziologie</a:t>
+            </a:r>
+            <a:endParaRPr lang="de-DE" dirty="0"/>
+          </a:p>
+        </p:txBody>
+      </p:sp>
+      <p:sp>
+        <p:nvSpPr>
+          <p:cNvPr id="3" name="Inhaltsplatzhalter 2"/>
+          <p:cNvSpPr>
+            <a:spLocks noGrp="1"/>
+          </p:cNvSpPr>
+          <p:nvPr>
+            <p:ph idx="1"/>
+          </p:nvPr>
+        </p:nvSpPr>
+        <p:spPr/>
+        <p:txBody>
+          <a:bodyPr/>
+          <a:lstStyle/>
+          <a:p>
+            <a:r>
+              <a:rPr lang="de-DE" dirty="0" smtClean="0"/>
+              <a:t>Anspruch:</a:t>
+            </a:r>
+          </a:p>
+          <a:p>
+            <a:pPr lvl="1"/>
+            <a:r>
+              <a:rPr lang="de-DE" dirty="0" smtClean="0"/>
+              <a:t>Eine Universaltheorie im Sinne eines umfassenden und kohärenten Theoriegebäudes für alle Formen von Sozialität</a:t>
+            </a:r>
+            <a:endParaRPr lang="de-DE" dirty="0"/>
+          </a:p>
+        </p:txBody>
+      </p:sp>
+      <p:sp>
+        <p:nvSpPr>
+          <p:cNvPr id="4" name="Fußzeilenplatzhalter 3"/>
+          <p:cNvSpPr>
+            <a:spLocks noGrp="1"/>
+          </p:cNvSpPr>
+          <p:nvPr>
+            <p:ph type="ftr" sz="quarter" idx="11"/>
+          </p:nvPr>
+        </p:nvSpPr>
+        <p:spPr/>
+        <p:txBody>
+          <a:bodyPr/>
+          <a:lstStyle/>
+          <a:p>
+            <a:r>
+              <a:rPr lang="en-US" smtClean="0"/>
+              <a:t>| Dominik Meixner | Dominique Cheray |</a:t>
+            </a:r>
+            <a:endParaRPr lang="en-US" dirty="0"/>
+          </a:p>
+        </p:txBody>
+      </p:sp>
+    </p:spTree>
+    <p:extLst>
+      <p:ext uri="{BB962C8B-B14F-4D97-AF65-F5344CB8AC3E}">
+        <p14:creationId xmlns:p14="http://schemas.microsoft.com/office/powerpoint/2010/main" val="2484073621"/>
+      </p:ext>
+    </p:extLst>
+  </p:cSld>
+  <p:clrMapOvr>
+    <a:masterClrMapping/>
+  </p:clrMapOvr>
+  <p:timing>
+    <p:tnLst>
+      <p:par>
+        <p:cTn id="1" dur="indefinite" restart="never" nodeType="tmRoot"/>
+      </p:par>
+    </p:tnLst>
+  </p:timing>
+</p:sld>
+</file>
+
+<file path=ppt/slides/slide39.xml><?xml version="1.0" encoding="utf-8"?>
+<p:sld xmlns:a="http://schemas.openxmlformats.org/drawingml/2006/main" xmlns:r="http://schemas.openxmlformats.org/officeDocument/2006/relationships" xmlns:p="http://schemas.openxmlformats.org/presentationml/2006/main">
+  <p:cSld>
+    <p:spTree>
+      <p:nvGrpSpPr>
+        <p:cNvPr id="1" name=""/>
+        <p:cNvGrpSpPr/>
+        <p:nvPr/>
+      </p:nvGrpSpPr>
+      <p:grpSpPr>
+        <a:xfrm>
+          <a:off x="0" y="0"/>
+          <a:ext cx="0" cy="0"/>
+          <a:chOff x="0" y="0"/>
+          <a:chExt cx="0" cy="0"/>
+        </a:xfrm>
+      </p:grpSpPr>
+      <p:sp>
+        <p:nvSpPr>
+          <p:cNvPr id="2" name="Titel 1"/>
+          <p:cNvSpPr>
+            <a:spLocks noGrp="1"/>
+          </p:cNvSpPr>
+          <p:nvPr>
+            <p:ph type="title"/>
+          </p:nvPr>
+        </p:nvSpPr>
+        <p:spPr/>
+        <p:txBody>
+          <a:bodyPr/>
+          <a:lstStyle/>
+          <a:p>
+            <a:r>
+              <a:rPr lang="de-DE" dirty="0" smtClean="0"/>
+              <a:t>Systemorientierte Ansätze - Soziotechnischer Ansatz</a:t>
+            </a:r>
+            <a:endParaRPr lang="de-DE" dirty="0"/>
+          </a:p>
+        </p:txBody>
+      </p:sp>
+      <p:sp>
+        <p:nvSpPr>
+          <p:cNvPr id="3" name="Inhaltsplatzhalter 2"/>
+          <p:cNvSpPr>
+            <a:spLocks noGrp="1"/>
+          </p:cNvSpPr>
+          <p:nvPr>
+            <p:ph idx="1"/>
+          </p:nvPr>
+        </p:nvSpPr>
+        <p:spPr/>
+        <p:txBody>
+          <a:bodyPr/>
+          <a:lstStyle/>
+          <a:p>
+            <a:r>
+              <a:rPr lang="de-DE" dirty="0" smtClean="0"/>
+              <a:t>Arbeit menschlicher gestalten und dabei gleichzeitig die Leistung steigern</a:t>
+            </a:r>
+          </a:p>
+          <a:p>
+            <a:r>
+              <a:rPr lang="de-DE" dirty="0" smtClean="0"/>
+              <a:t>Betrachtet Organisationssysteme als offene Systeme mit der Hauptaufgabe Input in Output zu transformieren</a:t>
+            </a:r>
+          </a:p>
+          <a:p>
+            <a:r>
+              <a:rPr lang="de-DE" dirty="0" smtClean="0"/>
+              <a:t>Mensch, Arbeit und Technik werden grundsätzlich als gleichwertig betrachtet</a:t>
+            </a:r>
+            <a:endParaRPr lang="de-DE" dirty="0"/>
+          </a:p>
+        </p:txBody>
+      </p:sp>
+      <p:sp>
+        <p:nvSpPr>
+          <p:cNvPr id="4" name="Fußzeilenplatzhalter 3"/>
+          <p:cNvSpPr>
+            <a:spLocks noGrp="1"/>
+          </p:cNvSpPr>
+          <p:nvPr>
+            <p:ph type="ftr" sz="quarter" idx="11"/>
+          </p:nvPr>
+        </p:nvSpPr>
+        <p:spPr/>
+        <p:txBody>
+          <a:bodyPr/>
+          <a:lstStyle/>
+          <a:p>
+            <a:r>
+              <a:rPr lang="en-US" smtClean="0"/>
+              <a:t>| Dominik Meixner | Dominique Cheray |</a:t>
+            </a:r>
+            <a:endParaRPr lang="en-US" dirty="0"/>
+          </a:p>
+        </p:txBody>
+      </p:sp>
+    </p:spTree>
+    <p:extLst>
+      <p:ext uri="{BB962C8B-B14F-4D97-AF65-F5344CB8AC3E}">
+        <p14:creationId xmlns:p14="http://schemas.microsoft.com/office/powerpoint/2010/main" val="2455607082"/>
+      </p:ext>
+    </p:extLst>
+  </p:cSld>
+  <p:clrMapOvr>
+    <a:masterClrMapping/>
+  </p:clrMapOvr>
+  <p:timing>
+    <p:tnLst>
+      <p:par>
+        <p:cTn id="1" dur="indefinite" restart="never" nodeType="tmRoot"/>
+      </p:par>
+    </p:tnLst>
+  </p:timing>
+</p:sld>
+</file>
+
+<file path=ppt/slides/slide4.xml><?xml version="1.0" encoding="utf-8"?>
+<p:sld xmlns:a="http://schemas.openxmlformats.org/drawingml/2006/main" xmlns:r="http://schemas.openxmlformats.org/officeDocument/2006/relationships" xmlns:p="http://schemas.openxmlformats.org/presentationml/2006/main">
+  <p:cSld>
+    <p:spTree>
+      <p:nvGrpSpPr>
+        <p:cNvPr id="1" name=""/>
+        <p:cNvGrpSpPr/>
+        <p:nvPr/>
+      </p:nvGrpSpPr>
+      <p:grpSpPr>
+        <a:xfrm>
+          <a:off x="0" y="0"/>
+          <a:ext cx="0" cy="0"/>
+          <a:chOff x="0" y="0"/>
+          <a:chExt cx="0" cy="0"/>
+        </a:xfrm>
+      </p:grpSpPr>
+      <p:sp>
+        <p:nvSpPr>
+          <p:cNvPr id="2" name="Titel 1"/>
+          <p:cNvSpPr>
+            <a:spLocks noGrp="1"/>
+          </p:cNvSpPr>
+          <p:nvPr>
+            <p:ph type="title"/>
+          </p:nvPr>
+        </p:nvSpPr>
+        <p:spPr/>
+        <p:txBody>
+          <a:bodyPr/>
+          <a:lstStyle/>
+          <a:p>
+            <a:r>
+              <a:rPr lang="de-DE" dirty="0"/>
+              <a:t>Definition Organisationstheorie</a:t>
+            </a:r>
+          </a:p>
+        </p:txBody>
+      </p:sp>
+      <p:sp>
+        <p:nvSpPr>
+          <p:cNvPr id="3" name="Inhaltsplatzhalter 2"/>
+          <p:cNvSpPr>
+            <a:spLocks noGrp="1"/>
+          </p:cNvSpPr>
+          <p:nvPr>
+            <p:ph idx="1"/>
+          </p:nvPr>
+        </p:nvSpPr>
+        <p:spPr/>
+        <p:txBody>
+          <a:bodyPr/>
+          <a:lstStyle/>
+          <a:p>
+            <a:r>
+              <a:rPr lang="de-DE" dirty="0" smtClean="0"/>
+              <a:t>Zweck: Organisationen sowie organisationsimmanentes Verhalten untersuchen und erklären</a:t>
+            </a:r>
+          </a:p>
+          <a:p>
+            <a:r>
+              <a:rPr lang="de-DE" dirty="0" smtClean="0"/>
+              <a:t>Vielzahl von Organisationstheorien, da Organisationen komplexe Gebilde sind und der Gegenstand der Organisationstheorie sehr breit ist</a:t>
+            </a:r>
+          </a:p>
+        </p:txBody>
+      </p:sp>
+      <p:sp>
+        <p:nvSpPr>
+          <p:cNvPr id="4" name="Fußzeilenplatzhalter 3"/>
+          <p:cNvSpPr>
+            <a:spLocks noGrp="1"/>
+          </p:cNvSpPr>
+          <p:nvPr>
+            <p:ph type="ftr" sz="quarter" idx="11"/>
+          </p:nvPr>
+        </p:nvSpPr>
+        <p:spPr/>
+        <p:txBody>
+          <a:bodyPr/>
+          <a:lstStyle/>
+          <a:p>
+            <a:r>
+              <a:rPr lang="en-US" smtClean="0"/>
+              <a:t>| Dominik Meixner | Dominique Cheray |</a:t>
+            </a:r>
+            <a:endParaRPr lang="en-US" dirty="0"/>
+          </a:p>
+        </p:txBody>
+      </p:sp>
+    </p:spTree>
+    <p:extLst>
+      <p:ext uri="{BB962C8B-B14F-4D97-AF65-F5344CB8AC3E}">
+        <p14:creationId xmlns:p14="http://schemas.microsoft.com/office/powerpoint/2010/main" val="1164444747"/>
+      </p:ext>
+    </p:extLst>
+  </p:cSld>
+  <p:clrMapOvr>
+    <a:masterClrMapping/>
+  </p:clrMapOvr>
+  <p:timing>
+    <p:tnLst>
+      <p:par>
+        <p:cTn id="1" dur="indefinite" restart="never" nodeType="tmRoot"/>
+      </p:par>
+    </p:tnLst>
+  </p:timing>
+</p:sld>
+</file>
+
+<file path=ppt/slides/slide40.xml><?xml version="1.0" encoding="utf-8"?>
+<p:sld xmlns:a="http://schemas.openxmlformats.org/drawingml/2006/main" xmlns:r="http://schemas.openxmlformats.org/officeDocument/2006/relationships" xmlns:p="http://schemas.openxmlformats.org/presentationml/2006/main">
+  <p:cSld>
+    <p:spTree>
+      <p:nvGrpSpPr>
+        <p:cNvPr id="1" name=""/>
+        <p:cNvGrpSpPr/>
+        <p:nvPr/>
+      </p:nvGrpSpPr>
+      <p:grpSpPr>
+        <a:xfrm>
+          <a:off x="0" y="0"/>
+          <a:ext cx="0" cy="0"/>
+          <a:chOff x="0" y="0"/>
+          <a:chExt cx="0" cy="0"/>
+        </a:xfrm>
+      </p:grpSpPr>
+      <p:sp>
+        <p:nvSpPr>
+          <p:cNvPr id="2" name="Titel 1"/>
+          <p:cNvSpPr>
+            <a:spLocks noGrp="1"/>
+          </p:cNvSpPr>
+          <p:nvPr>
+            <p:ph type="title"/>
+          </p:nvPr>
+        </p:nvSpPr>
+        <p:spPr/>
+        <p:txBody>
+          <a:bodyPr/>
+          <a:lstStyle/>
+          <a:p>
+            <a:r>
+              <a:rPr lang="de-DE" dirty="0"/>
+              <a:t>Systemorientierte Ansätze </a:t>
+            </a:r>
+            <a:r>
+              <a:rPr lang="de-DE" dirty="0" smtClean="0"/>
+              <a:t>– Soziosystemischer Ansatz</a:t>
+            </a:r>
+            <a:endParaRPr lang="de-DE" dirty="0"/>
+          </a:p>
+        </p:txBody>
+      </p:sp>
+      <p:sp>
+        <p:nvSpPr>
+          <p:cNvPr id="3" name="Inhaltsplatzhalter 2"/>
+          <p:cNvSpPr>
+            <a:spLocks noGrp="1"/>
+          </p:cNvSpPr>
+          <p:nvPr>
+            <p:ph idx="1"/>
+          </p:nvPr>
+        </p:nvSpPr>
+        <p:spPr/>
+        <p:txBody>
+          <a:bodyPr/>
+          <a:lstStyle/>
+          <a:p>
+            <a:r>
+              <a:rPr lang="de-DE" dirty="0" smtClean="0"/>
+              <a:t>Betrachtet Organisation als ein soziales System, dessen Teile ihre eigenen Zwecke verfolgen</a:t>
+            </a:r>
+          </a:p>
+          <a:p>
+            <a:r>
+              <a:rPr lang="de-DE" dirty="0" smtClean="0"/>
+              <a:t>Ziel des Systems als ganzes:</a:t>
+            </a:r>
+          </a:p>
+          <a:p>
+            <a:pPr lvl="1"/>
+            <a:r>
+              <a:rPr lang="de-DE" dirty="0" smtClean="0"/>
+              <a:t>Sich selbst, seine Teile und oft auch das übergeordnete System weiter entwickeln</a:t>
+            </a:r>
+            <a:endParaRPr lang="de-DE" dirty="0"/>
+          </a:p>
+        </p:txBody>
+      </p:sp>
+      <p:sp>
+        <p:nvSpPr>
+          <p:cNvPr id="4" name="Fußzeilenplatzhalter 3"/>
+          <p:cNvSpPr>
+            <a:spLocks noGrp="1"/>
+          </p:cNvSpPr>
+          <p:nvPr>
+            <p:ph type="ftr" sz="quarter" idx="11"/>
+          </p:nvPr>
+        </p:nvSpPr>
+        <p:spPr/>
+        <p:txBody>
+          <a:bodyPr/>
+          <a:lstStyle/>
+          <a:p>
+            <a:r>
+              <a:rPr lang="en-US" smtClean="0"/>
+              <a:t>| Dominik Meixner | Dominique Cheray |</a:t>
+            </a:r>
+            <a:endParaRPr lang="en-US" dirty="0"/>
+          </a:p>
+        </p:txBody>
+      </p:sp>
+    </p:spTree>
+    <p:extLst>
+      <p:ext uri="{BB962C8B-B14F-4D97-AF65-F5344CB8AC3E}">
+        <p14:creationId xmlns:p14="http://schemas.microsoft.com/office/powerpoint/2010/main" val="3722736148"/>
+      </p:ext>
+    </p:extLst>
+  </p:cSld>
+  <p:clrMapOvr>
+    <a:masterClrMapping/>
+  </p:clrMapOvr>
+  <p:timing>
+    <p:tnLst>
+      <p:par>
+        <p:cTn id="1" dur="indefinite" restart="never" nodeType="tmRoot"/>
+      </p:par>
+    </p:tnLst>
+  </p:timing>
+</p:sld>
+</file>
+
+<file path=ppt/slides/slide41.xml><?xml version="1.0" encoding="utf-8"?>
+<p:sld xmlns:a="http://schemas.openxmlformats.org/drawingml/2006/main" xmlns:r="http://schemas.openxmlformats.org/officeDocument/2006/relationships" xmlns:p="http://schemas.openxmlformats.org/presentationml/2006/main">
+  <p:cSld>
+    <p:spTree>
+      <p:nvGrpSpPr>
+        <p:cNvPr id="1" name=""/>
+        <p:cNvGrpSpPr/>
+        <p:nvPr/>
+      </p:nvGrpSpPr>
+      <p:grpSpPr>
+        <a:xfrm>
+          <a:off x="0" y="0"/>
+          <a:ext cx="0" cy="0"/>
+          <a:chOff x="0" y="0"/>
+          <a:chExt cx="0" cy="0"/>
+        </a:xfrm>
+      </p:grpSpPr>
+      <p:sp>
+        <p:nvSpPr>
+          <p:cNvPr id="2" name="Titel 1"/>
+          <p:cNvSpPr>
+            <a:spLocks noGrp="1"/>
+          </p:cNvSpPr>
+          <p:nvPr>
+            <p:ph type="title"/>
+          </p:nvPr>
+        </p:nvSpPr>
+        <p:spPr/>
+        <p:txBody>
+          <a:bodyPr/>
+          <a:lstStyle/>
+          <a:p>
+            <a:r>
+              <a:rPr lang="de-DE" dirty="0" smtClean="0"/>
+              <a:t>Systemorientierte Ansätze- Berücksichtigung der Motivation</a:t>
+            </a:r>
+            <a:endParaRPr lang="de-DE" dirty="0"/>
+          </a:p>
+        </p:txBody>
+      </p:sp>
+      <p:sp>
+        <p:nvSpPr>
+          <p:cNvPr id="3" name="Inhaltsplatzhalter 2"/>
+          <p:cNvSpPr>
+            <a:spLocks noGrp="1"/>
+          </p:cNvSpPr>
+          <p:nvPr>
+            <p:ph idx="1"/>
+          </p:nvPr>
+        </p:nvSpPr>
+        <p:spPr/>
+        <p:txBody>
+          <a:bodyPr/>
+          <a:lstStyle/>
+          <a:p>
+            <a:r>
+              <a:rPr lang="de-DE" dirty="0" smtClean="0"/>
+              <a:t>Wichtiges Kennzeichen eines Systems: </a:t>
+            </a:r>
+          </a:p>
+          <a:p>
+            <a:pPr lvl="1"/>
+            <a:r>
+              <a:rPr lang="de-DE" dirty="0"/>
+              <a:t>der ganzheitliche Zusammenhang von Dingen, Vorgängen und </a:t>
+            </a:r>
+            <a:r>
+              <a:rPr lang="de-DE" dirty="0" smtClean="0"/>
+              <a:t>Teilen</a:t>
+            </a:r>
+          </a:p>
+          <a:p>
+            <a:r>
+              <a:rPr lang="de-DE" dirty="0" smtClean="0"/>
+              <a:t>Wesen der einzelnen Bestandteile wird vom übergeordneten Ganzen bestimmt</a:t>
+            </a:r>
+          </a:p>
+        </p:txBody>
+      </p:sp>
+      <p:sp>
+        <p:nvSpPr>
+          <p:cNvPr id="4" name="Fußzeilenplatzhalter 3"/>
+          <p:cNvSpPr>
+            <a:spLocks noGrp="1"/>
+          </p:cNvSpPr>
+          <p:nvPr>
+            <p:ph type="ftr" sz="quarter" idx="11"/>
+          </p:nvPr>
+        </p:nvSpPr>
+        <p:spPr/>
+        <p:txBody>
+          <a:bodyPr/>
+          <a:lstStyle/>
+          <a:p>
+            <a:r>
+              <a:rPr lang="en-US" smtClean="0"/>
+              <a:t>| Dominik Meixner | Dominique Cheray |</a:t>
+            </a:r>
+            <a:endParaRPr lang="en-US" dirty="0"/>
+          </a:p>
+        </p:txBody>
+      </p:sp>
+    </p:spTree>
+    <p:extLst>
+      <p:ext uri="{BB962C8B-B14F-4D97-AF65-F5344CB8AC3E}">
+        <p14:creationId xmlns:p14="http://schemas.microsoft.com/office/powerpoint/2010/main" val="738401427"/>
+      </p:ext>
+    </p:extLst>
+  </p:cSld>
+  <p:clrMapOvr>
+    <a:masterClrMapping/>
+  </p:clrMapOvr>
+  <p:timing>
+    <p:tnLst>
+      <p:par>
+        <p:cTn id="1" dur="indefinite" restart="never" nodeType="tmRoot"/>
+      </p:par>
+    </p:tnLst>
+  </p:timing>
+</p:sld>
+</file>
+
+<file path=ppt/slides/slide42.xml><?xml version="1.0" encoding="utf-8"?>
+<p:sld xmlns:a="http://schemas.openxmlformats.org/drawingml/2006/main" xmlns:r="http://schemas.openxmlformats.org/officeDocument/2006/relationships" xmlns:p="http://schemas.openxmlformats.org/presentationml/2006/main">
+  <p:cSld>
+    <p:spTree>
+      <p:nvGrpSpPr>
+        <p:cNvPr id="1" name=""/>
+        <p:cNvGrpSpPr/>
+        <p:nvPr/>
+      </p:nvGrpSpPr>
+      <p:grpSpPr>
+        <a:xfrm>
+          <a:off x="0" y="0"/>
+          <a:ext cx="0" cy="0"/>
+          <a:chOff x="0" y="0"/>
+          <a:chExt cx="0" cy="0"/>
+        </a:xfrm>
+      </p:grpSpPr>
+      <p:sp>
+        <p:nvSpPr>
+          <p:cNvPr id="2" name="Titel 1"/>
+          <p:cNvSpPr>
+            <a:spLocks noGrp="1"/>
+          </p:cNvSpPr>
+          <p:nvPr>
+            <p:ph type="title"/>
+          </p:nvPr>
+        </p:nvSpPr>
+        <p:spPr/>
+        <p:txBody>
+          <a:bodyPr/>
+          <a:lstStyle/>
+          <a:p>
+            <a:r>
+              <a:rPr lang="de-DE" dirty="0"/>
+              <a:t>Systemorientierte Ansätze- Berücksichtigung der Motivation</a:t>
+            </a:r>
+          </a:p>
+        </p:txBody>
+      </p:sp>
+      <p:sp>
+        <p:nvSpPr>
+          <p:cNvPr id="3" name="Inhaltsplatzhalter 2"/>
+          <p:cNvSpPr>
+            <a:spLocks noGrp="1"/>
+          </p:cNvSpPr>
+          <p:nvPr>
+            <p:ph idx="1"/>
+          </p:nvPr>
+        </p:nvSpPr>
+        <p:spPr/>
+        <p:txBody>
+          <a:bodyPr>
+            <a:noAutofit/>
+          </a:bodyPr>
+          <a:lstStyle/>
+          <a:p>
+            <a:r>
+              <a:rPr lang="de-DE" dirty="0"/>
+              <a:t>Mensch ist ein Element des Systems </a:t>
+            </a:r>
+            <a:endParaRPr lang="de-DE" dirty="0" smtClean="0"/>
+          </a:p>
+          <a:p>
+            <a:r>
+              <a:rPr lang="de-DE" dirty="0" smtClean="0"/>
+              <a:t>Mensch ist mehr als nur im Mittelpunkt der Organisation</a:t>
+            </a:r>
+          </a:p>
+          <a:p>
+            <a:r>
+              <a:rPr lang="de-DE" dirty="0" smtClean="0"/>
+              <a:t>Neben seiner Mitgliedschaft in der Organisation ist er auch Mitglied der Unternehmensumwelt</a:t>
+            </a:r>
+          </a:p>
+        </p:txBody>
+      </p:sp>
+      <p:sp>
+        <p:nvSpPr>
+          <p:cNvPr id="4" name="Fußzeilenplatzhalter 3"/>
+          <p:cNvSpPr>
+            <a:spLocks noGrp="1"/>
+          </p:cNvSpPr>
+          <p:nvPr>
+            <p:ph type="ftr" sz="quarter" idx="11"/>
+          </p:nvPr>
+        </p:nvSpPr>
+        <p:spPr/>
+        <p:txBody>
+          <a:bodyPr/>
+          <a:lstStyle/>
+          <a:p>
+            <a:r>
+              <a:rPr lang="en-US" smtClean="0"/>
+              <a:t>| Dominik Meixner | Dominique Cheray |</a:t>
+            </a:r>
+            <a:endParaRPr lang="en-US" dirty="0"/>
+          </a:p>
+        </p:txBody>
+      </p:sp>
+    </p:spTree>
+    <p:extLst>
+      <p:ext uri="{BB962C8B-B14F-4D97-AF65-F5344CB8AC3E}">
+        <p14:creationId xmlns:p14="http://schemas.microsoft.com/office/powerpoint/2010/main" val="1371816809"/>
+      </p:ext>
+    </p:extLst>
+  </p:cSld>
+  <p:clrMapOvr>
+    <a:masterClrMapping/>
+  </p:clrMapOvr>
+  <p:timing>
+    <p:tnLst>
+      <p:par>
+        <p:cTn id="1" dur="indefinite" restart="never" nodeType="tmRoot"/>
+      </p:par>
+    </p:tnLst>
+  </p:timing>
+</p:sld>
+</file>
+
+<file path=ppt/slides/slide43.xml><?xml version="1.0" encoding="utf-8"?>
+<p:sld xmlns:a="http://schemas.openxmlformats.org/drawingml/2006/main" xmlns:r="http://schemas.openxmlformats.org/officeDocument/2006/relationships" xmlns:p="http://schemas.openxmlformats.org/presentationml/2006/main">
+  <p:cSld>
+    <p:spTree>
+      <p:nvGrpSpPr>
+        <p:cNvPr id="1" name=""/>
+        <p:cNvGrpSpPr/>
+        <p:nvPr/>
+      </p:nvGrpSpPr>
+      <p:grpSpPr>
+        <a:xfrm>
+          <a:off x="0" y="0"/>
+          <a:ext cx="0" cy="0"/>
+          <a:chOff x="0" y="0"/>
+          <a:chExt cx="0" cy="0"/>
+        </a:xfrm>
+      </p:grpSpPr>
+      <p:sp>
+        <p:nvSpPr>
+          <p:cNvPr id="2" name="Titel 1"/>
+          <p:cNvSpPr>
+            <a:spLocks noGrp="1"/>
+          </p:cNvSpPr>
+          <p:nvPr>
+            <p:ph type="title"/>
+          </p:nvPr>
+        </p:nvSpPr>
+        <p:spPr/>
+        <p:txBody>
+          <a:bodyPr/>
+          <a:lstStyle/>
+          <a:p>
+            <a:r>
+              <a:rPr lang="de-DE" dirty="0"/>
+              <a:t>Systemorientierte Ansätze- Berücksichtigung der Motivation</a:t>
+            </a:r>
+          </a:p>
+        </p:txBody>
+      </p:sp>
+      <p:sp>
+        <p:nvSpPr>
+          <p:cNvPr id="3" name="Inhaltsplatzhalter 2"/>
+          <p:cNvSpPr>
+            <a:spLocks noGrp="1"/>
+          </p:cNvSpPr>
+          <p:nvPr>
+            <p:ph idx="1"/>
+          </p:nvPr>
+        </p:nvSpPr>
+        <p:spPr/>
+        <p:txBody>
+          <a:bodyPr/>
+          <a:lstStyle/>
+          <a:p>
+            <a:r>
+              <a:rPr lang="de-DE" dirty="0"/>
+              <a:t>Vielfältige Beziehungen des Menschen zu seiner Umwelt haben auch Einfluss auf sein Wahrnehmungs- und Lernverhalten</a:t>
+            </a:r>
+          </a:p>
+          <a:p>
+            <a:r>
+              <a:rPr lang="de-DE" dirty="0"/>
+              <a:t>Konsequenterweise hat dies rückwirkend Einfluss auf das System</a:t>
+            </a:r>
+          </a:p>
+          <a:p>
+            <a:endParaRPr lang="de-DE" dirty="0"/>
+          </a:p>
+        </p:txBody>
+      </p:sp>
+      <p:sp>
+        <p:nvSpPr>
+          <p:cNvPr id="4" name="Fußzeilenplatzhalter 3"/>
+          <p:cNvSpPr>
+            <a:spLocks noGrp="1"/>
+          </p:cNvSpPr>
+          <p:nvPr>
+            <p:ph type="ftr" sz="quarter" idx="11"/>
+          </p:nvPr>
+        </p:nvSpPr>
+        <p:spPr/>
+        <p:txBody>
+          <a:bodyPr/>
+          <a:lstStyle/>
+          <a:p>
+            <a:r>
+              <a:rPr lang="en-US" smtClean="0"/>
+              <a:t>| Dominik Meixner | Dominique Cheray |</a:t>
+            </a:r>
+            <a:endParaRPr lang="en-US" dirty="0"/>
+          </a:p>
+        </p:txBody>
+      </p:sp>
+    </p:spTree>
+    <p:extLst>
+      <p:ext uri="{BB962C8B-B14F-4D97-AF65-F5344CB8AC3E}">
+        <p14:creationId xmlns:p14="http://schemas.microsoft.com/office/powerpoint/2010/main" val="2766289606"/>
+      </p:ext>
+    </p:extLst>
+  </p:cSld>
+  <p:clrMapOvr>
+    <a:masterClrMapping/>
+  </p:clrMapOvr>
+  <p:timing>
+    <p:tnLst>
+      <p:par>
+        <p:cTn id="1" dur="indefinite" restart="never" nodeType="tmRoot"/>
+      </p:par>
+    </p:tnLst>
+  </p:timing>
+</p:sld>
+</file>
+
+<file path=ppt/slides/slide44.xml><?xml version="1.0" encoding="utf-8"?>
 <p:sld xmlns:a="http://schemas.openxmlformats.org/drawingml/2006/main" xmlns:r="http://schemas.openxmlformats.org/officeDocument/2006/relationships" xmlns:p="http://schemas.openxmlformats.org/presentationml/2006/main">
   <p:cSld>
     <p:spTree>
@@ -9166,21 +11893,62 @@
         </p:nvSpPr>
         <p:spPr>
           <a:xfrm>
-            <a:off x="5007836" y="2160590"/>
-            <a:ext cx="4266166" cy="2701968"/>
+            <a:off x="5007836" y="2160589"/>
+            <a:ext cx="4266166" cy="3380401"/>
           </a:xfrm>
         </p:spPr>
         <p:txBody>
           <a:bodyPr>
-            <a:normAutofit/>
+            <a:noAutofit/>
           </a:bodyPr>
           <a:lstStyle/>
           <a:p>
-            <a:r>
-              <a:rPr lang="de-DE" sz="1800" dirty="0" smtClean="0"/>
-              <a:t>Quellen</a:t>
-            </a:r>
-            <a:endParaRPr lang="de-DE" sz="1800" dirty="0"/>
+            <a:pPr marL="0" indent="0">
+              <a:buNone/>
+            </a:pPr>
+            <a:r>
+              <a:rPr lang="de-DE" sz="1600" dirty="0" smtClean="0"/>
+              <a:t>Quellen (1.4.15):</a:t>
+            </a:r>
+          </a:p>
+          <a:p>
+            <a:r>
+              <a:rPr lang="de-DE" sz="1600" dirty="0" smtClean="0"/>
+              <a:t>http</a:t>
+            </a:r>
+            <a:r>
+              <a:rPr lang="de-DE" sz="1600" dirty="0"/>
+              <a:t>://de.wikipedia.org/w/index.php?title=Organisationstheorie&amp;oldid=139295730 </a:t>
+            </a:r>
+          </a:p>
+          <a:p>
+            <a:r>
+              <a:rPr lang="de-DE" sz="1600" dirty="0"/>
+              <a:t>https://www.uni-hohenheim.de/fileadmin/einrichtungen/marktlehre/Skripte/Oekonomik/oekonomik_kap_4_5.pdf </a:t>
+            </a:r>
+          </a:p>
+          <a:p>
+            <a:r>
+              <a:rPr lang="de-DE" sz="1600" dirty="0"/>
+              <a:t>http://www.it-infothek.de/fhtw/bwl_03.html </a:t>
+            </a:r>
+          </a:p>
+          <a:p>
+            <a:r>
+              <a:rPr lang="de-DE" sz="1600" dirty="0"/>
+              <a:t>http://www2.uni-erfurt.de/organisationslehre/docs/OT.pdf </a:t>
+            </a:r>
+          </a:p>
+          <a:p>
+            <a:r>
+              <a:rPr lang="de-DE" sz="1600" dirty="0"/>
+              <a:t>http://</a:t>
+            </a:r>
+            <a:r>
+              <a:rPr lang="de-DE" sz="1600" dirty="0" smtClean="0"/>
+              <a:t>www.vordenker.de/gerald/sysansatz.html</a:t>
+            </a:r>
+            <a:endParaRPr lang="de-DE" sz="1600" dirty="0"/>
           </a:p>
         </p:txBody>
       </p:sp>
@@ -9211,218 +11979,6 @@
     <p:extLst>
       <p:ext uri="{BB962C8B-B14F-4D97-AF65-F5344CB8AC3E}">
         <p14:creationId xmlns:p14="http://schemas.microsoft.com/office/powerpoint/2010/main" val="1827241420"/>
-      </p:ext>
-    </p:extLst>
-  </p:cSld>
-  <p:clrMapOvr>
-    <a:masterClrMapping/>
-  </p:clrMapOvr>
-  <p:timing>
-    <p:tnLst>
-      <p:par>
-        <p:cTn id="1" dur="indefinite" restart="never" nodeType="tmRoot"/>
-      </p:par>
-    </p:tnLst>
-  </p:timing>
-</p:sld>
-</file>
-
-<file path=ppt/slides/slide3.xml><?xml version="1.0" encoding="utf-8"?>
-<p:sld xmlns:a="http://schemas.openxmlformats.org/drawingml/2006/main" xmlns:r="http://schemas.openxmlformats.org/officeDocument/2006/relationships" xmlns:p="http://schemas.openxmlformats.org/presentationml/2006/main">
-  <p:cSld>
-    <p:spTree>
-      <p:nvGrpSpPr>
-        <p:cNvPr id="1" name=""/>
-        <p:cNvGrpSpPr/>
-        <p:nvPr/>
-      </p:nvGrpSpPr>
-      <p:grpSpPr>
-        <a:xfrm>
-          <a:off x="0" y="0"/>
-          <a:ext cx="0" cy="0"/>
-          <a:chOff x="0" y="0"/>
-          <a:chExt cx="0" cy="0"/>
-        </a:xfrm>
-      </p:grpSpPr>
-      <p:sp>
-        <p:nvSpPr>
-          <p:cNvPr id="2" name="Titel 1"/>
-          <p:cNvSpPr>
-            <a:spLocks noGrp="1"/>
-          </p:cNvSpPr>
-          <p:nvPr>
-            <p:ph type="title"/>
-          </p:nvPr>
-        </p:nvSpPr>
-        <p:spPr/>
-        <p:txBody>
-          <a:bodyPr/>
-          <a:lstStyle/>
-          <a:p>
-            <a:r>
-              <a:rPr lang="de-DE" dirty="0" smtClean="0"/>
-              <a:t>Definition Organisationstheorie</a:t>
-            </a:r>
-            <a:endParaRPr lang="de-DE" dirty="0"/>
-          </a:p>
-        </p:txBody>
-      </p:sp>
-      <p:sp>
-        <p:nvSpPr>
-          <p:cNvPr id="6" name="Textplatzhalter 5"/>
-          <p:cNvSpPr>
-            <a:spLocks noGrp="1"/>
-          </p:cNvSpPr>
-          <p:nvPr>
-            <p:ph type="body" idx="1"/>
-          </p:nvPr>
-        </p:nvSpPr>
-        <p:spPr/>
-        <p:txBody>
-          <a:bodyPr/>
-          <a:lstStyle/>
-          <a:p>
-            <a:endParaRPr lang="de-DE"/>
-          </a:p>
-        </p:txBody>
-      </p:sp>
-      <p:sp>
-        <p:nvSpPr>
-          <p:cNvPr id="4" name="Fußzeilenplatzhalter 3"/>
-          <p:cNvSpPr>
-            <a:spLocks noGrp="1"/>
-          </p:cNvSpPr>
-          <p:nvPr>
-            <p:ph type="ftr" sz="quarter" idx="11"/>
-          </p:nvPr>
-        </p:nvSpPr>
-        <p:spPr/>
-        <p:txBody>
-          <a:bodyPr/>
-          <a:lstStyle/>
-          <a:p>
-            <a:r>
-              <a:rPr lang="en-US" smtClean="0"/>
-              <a:t>| Dominik Meixner | Dominique Cheray |</a:t>
-            </a:r>
-            <a:endParaRPr lang="en-US" dirty="0"/>
-          </a:p>
-        </p:txBody>
-      </p:sp>
-    </p:spTree>
-    <p:extLst>
-      <p:ext uri="{BB962C8B-B14F-4D97-AF65-F5344CB8AC3E}">
-        <p14:creationId xmlns:p14="http://schemas.microsoft.com/office/powerpoint/2010/main" val="2849313809"/>
-      </p:ext>
-    </p:extLst>
-  </p:cSld>
-  <p:clrMapOvr>
-    <a:masterClrMapping/>
-  </p:clrMapOvr>
-  <p:timing>
-    <p:tnLst>
-      <p:par>
-        <p:cTn id="1" dur="indefinite" restart="never" nodeType="tmRoot"/>
-      </p:par>
-    </p:tnLst>
-  </p:timing>
-</p:sld>
-</file>
-
-<file path=ppt/slides/slide4.xml><?xml version="1.0" encoding="utf-8"?>
-<p:sld xmlns:a="http://schemas.openxmlformats.org/drawingml/2006/main" xmlns:r="http://schemas.openxmlformats.org/officeDocument/2006/relationships" xmlns:p="http://schemas.openxmlformats.org/presentationml/2006/main">
-  <p:cSld>
-    <p:spTree>
-      <p:nvGrpSpPr>
-        <p:cNvPr id="1" name=""/>
-        <p:cNvGrpSpPr/>
-        <p:nvPr/>
-      </p:nvGrpSpPr>
-      <p:grpSpPr>
-        <a:xfrm>
-          <a:off x="0" y="0"/>
-          <a:ext cx="0" cy="0"/>
-          <a:chOff x="0" y="0"/>
-          <a:chExt cx="0" cy="0"/>
-        </a:xfrm>
-      </p:grpSpPr>
-      <p:sp>
-        <p:nvSpPr>
-          <p:cNvPr id="2" name="Titel 1"/>
-          <p:cNvSpPr>
-            <a:spLocks noGrp="1"/>
-          </p:cNvSpPr>
-          <p:nvPr>
-            <p:ph type="title"/>
-          </p:nvPr>
-        </p:nvSpPr>
-        <p:spPr/>
-        <p:txBody>
-          <a:bodyPr/>
-          <a:lstStyle/>
-          <a:p>
-            <a:r>
-              <a:rPr lang="de-DE" dirty="0"/>
-              <a:t>Definition Organisationstheorie</a:t>
-            </a:r>
-          </a:p>
-        </p:txBody>
-      </p:sp>
-      <p:sp>
-        <p:nvSpPr>
-          <p:cNvPr id="3" name="Inhaltsplatzhalter 2"/>
-          <p:cNvSpPr>
-            <a:spLocks noGrp="1"/>
-          </p:cNvSpPr>
-          <p:nvPr>
-            <p:ph idx="1"/>
-          </p:nvPr>
-        </p:nvSpPr>
-        <p:spPr/>
-        <p:txBody>
-          <a:bodyPr/>
-          <a:lstStyle/>
-          <a:p>
-            <a:r>
-              <a:rPr lang="de-DE" dirty="0" smtClean="0"/>
-              <a:t>Zweck: Organisationen sowie organisationsimmanentes Verhalten untersuchen und erklären</a:t>
-            </a:r>
-          </a:p>
-          <a:p>
-            <a:r>
-              <a:rPr lang="de-DE" dirty="0" smtClean="0"/>
-              <a:t>Vielzahl von Organisationstheorien, da Organisationen komplexe Gebilde sind und der Gegenstand der Organisationstheorie sehr breit ist</a:t>
-            </a:r>
-          </a:p>
-        </p:txBody>
-      </p:sp>
-      <p:sp>
-        <p:nvSpPr>
-          <p:cNvPr id="4" name="Fußzeilenplatzhalter 3"/>
-          <p:cNvSpPr>
-            <a:spLocks noGrp="1"/>
-          </p:cNvSpPr>
-          <p:nvPr>
-            <p:ph type="ftr" sz="quarter" idx="11"/>
-          </p:nvPr>
-        </p:nvSpPr>
-        <p:spPr/>
-        <p:txBody>
-          <a:bodyPr/>
-          <a:lstStyle/>
-          <a:p>
-            <a:r>
-              <a:rPr lang="en-US" smtClean="0"/>
-              <a:t>| Dominik Meixner | Dominique Cheray |</a:t>
-            </a:r>
-            <a:endParaRPr lang="en-US" dirty="0"/>
-          </a:p>
-        </p:txBody>
-      </p:sp>
-    </p:spTree>
-    <p:extLst>
-      <p:ext uri="{BB962C8B-B14F-4D97-AF65-F5344CB8AC3E}">
-        <p14:creationId xmlns:p14="http://schemas.microsoft.com/office/powerpoint/2010/main" val="1164444747"/>
       </p:ext>
     </p:extLst>
   </p:cSld>
@@ -10056,7 +12612,6 @@
               <a:rPr lang="de-DE" dirty="0"/>
               <a:t>des Managements steigern</a:t>
             </a:r>
-            <a:endParaRPr lang="de-DE" dirty="0"/>
           </a:p>
         </p:txBody>
       </p:sp>
@@ -10294,7 +12849,7 @@
   <a:extraClrSchemeLst/>
   <a:extLst>
     <a:ext uri="{05A4C25C-085E-4340-85A3-A5531E510DB2}">
-      <thm15:themeFamily xmlns:thm15="http://schemas.microsoft.com/office/thememl/2012/main" xmlns="" name="Facet" id="{C0C680CD-088A-49FC-A102-D699147F32B2}" vid="{CFBC31BA-B70F-4F30-BCAA-4F3011E16C4D}"/>
+      <thm15:themeFamily xmlns="" xmlns:thm15="http://schemas.microsoft.com/office/thememl/2012/main" name="Facet" id="{C0C680CD-088A-49FC-A102-D699147F32B2}" vid="{CFBC31BA-B70F-4F30-BCAA-4F3011E16C4D}"/>
     </a:ext>
   </a:extLst>
 </a:theme>
@@ -10555,7 +13110,7 @@
   <a:extraClrSchemeLst/>
   <a:extLst>
     <a:ext uri="{05A4C25C-085E-4340-85A3-A5531E510DB2}">
-      <thm15:themeFamily xmlns:thm15="http://schemas.microsoft.com/office/thememl/2012/main" xmlns="" name="Office Theme" id="{62F939B6-93AF-4DB8-9C6B-D6C7DFDC589F}" vid="{4A3C46E8-61CC-4603-A589-7422A47A8E4A}"/>
+      <thm15:themeFamily xmlns="" xmlns:thm15="http://schemas.microsoft.com/office/thememl/2012/main" name="Office Theme" id="{62F939B6-93AF-4DB8-9C6B-D6C7DFDC589F}" vid="{4A3C46E8-61CC-4603-A589-7422A47A8E4A}"/>
     </a:ext>
   </a:extLst>
 </a:theme>

</xml_diff>

<commit_message>
OSA 4 Präsentation abgeschlossen
Der letzte Feinschliff ist jetzt durch. Kritik ist immer willkommen.
</commit_message>
<xml_diff>
--- a/OrgatheoretAns/OrgatheoretAnsPraes.pptx
+++ b/OrgatheoretAns/OrgatheoretAnsPraes.pptx
@@ -10306,7 +10306,7 @@
             </a:r>
             <a:r>
               <a:rPr lang="de-DE" dirty="0" smtClean="0"/>
-              <a:t>Unternehmen</a:t>
+              <a:t>Unternehmen?</a:t>
             </a:r>
           </a:p>
           <a:p>
@@ -10317,7 +10317,7 @@
             </a:r>
             <a:r>
               <a:rPr lang="de-DE" dirty="0" smtClean="0"/>
-              <a:t>Organisationen unterschiedlich</a:t>
+              <a:t>Organisationen unterschiedlich?</a:t>
             </a:r>
           </a:p>
           <a:p>
@@ -10328,7 +10328,7 @@
             </a:r>
             <a:r>
               <a:rPr lang="de-DE" dirty="0" smtClean="0"/>
-              <a:t>effizient</a:t>
+              <a:t>effizient?</a:t>
             </a:r>
             <a:endParaRPr lang="de-DE" dirty="0"/>
           </a:p>
@@ -11390,7 +11390,7 @@
           <a:p>
             <a:r>
               <a:rPr lang="de-DE" dirty="0" smtClean="0"/>
-              <a:t>Ziel des Systems als ganzes:</a:t>
+              <a:t>Ziel des Systems als Ganzes:</a:t>
             </a:r>
           </a:p>
           <a:p>

</xml_diff>